<commit_message>
Prepearing to a performance
</commit_message>
<xml_diff>
--- a/Советский кроссворд.pptx
+++ b/Советский кроссворд.pptx
@@ -13,29 +13,29 @@
     <p:sldMasterId id="2147483664" r:id="rId10"/>
     <p:sldMasterId id="2147483666" r:id="rId11"/>
     <p:sldMasterId id="2147483668" r:id="rId12"/>
-    <p:sldMasterId id="2147483671" r:id="rId13"/>
-    <p:sldMasterId id="2147483673" r:id="rId14"/>
-    <p:sldMasterId id="2147483675" r:id="rId15"/>
-    <p:sldMasterId id="2147483677" r:id="rId16"/>
-    <p:sldMasterId id="2147483679" r:id="rId17"/>
-    <p:sldMasterId id="2147483681" r:id="rId18"/>
-    <p:sldMasterId id="2147483683" r:id="rId19"/>
-    <p:sldMasterId id="2147483685" r:id="rId20"/>
-    <p:sldMasterId id="2147483687" r:id="rId21"/>
-    <p:sldMasterId id="2147483689" r:id="rId22"/>
-    <p:sldMasterId id="2147483691" r:id="rId23"/>
-    <p:sldMasterId id="2147483693" r:id="rId24"/>
-    <p:sldMasterId id="2147483695" r:id="rId25"/>
-    <p:sldMasterId id="2147483699" r:id="rId26"/>
-    <p:sldMasterId id="2147483701" r:id="rId27"/>
-    <p:sldMasterId id="2147483703" r:id="rId28"/>
-    <p:sldMasterId id="2147483705" r:id="rId29"/>
-    <p:sldMasterId id="2147483707" r:id="rId30"/>
-    <p:sldMasterId id="2147483709" r:id="rId31"/>
-    <p:sldMasterId id="2147483711" r:id="rId32"/>
-    <p:sldMasterId id="2147483713" r:id="rId33"/>
-    <p:sldMasterId id="2147483715" r:id="rId34"/>
-    <p:sldMasterId id="2147483717" r:id="rId35"/>
+    <p:sldMasterId id="2147483674" r:id="rId13"/>
+    <p:sldMasterId id="2147483676" r:id="rId14"/>
+    <p:sldMasterId id="2147483678" r:id="rId15"/>
+    <p:sldMasterId id="2147483680" r:id="rId16"/>
+    <p:sldMasterId id="2147483682" r:id="rId17"/>
+    <p:sldMasterId id="2147483684" r:id="rId18"/>
+    <p:sldMasterId id="2147483686" r:id="rId19"/>
+    <p:sldMasterId id="2147483688" r:id="rId20"/>
+    <p:sldMasterId id="2147483690" r:id="rId21"/>
+    <p:sldMasterId id="2147483692" r:id="rId22"/>
+    <p:sldMasterId id="2147483694" r:id="rId23"/>
+    <p:sldMasterId id="2147483696" r:id="rId24"/>
+    <p:sldMasterId id="2147483698" r:id="rId25"/>
+    <p:sldMasterId id="2147483702" r:id="rId26"/>
+    <p:sldMasterId id="2147483704" r:id="rId27"/>
+    <p:sldMasterId id="2147483706" r:id="rId28"/>
+    <p:sldMasterId id="2147483708" r:id="rId29"/>
+    <p:sldMasterId id="2147483710" r:id="rId30"/>
+    <p:sldMasterId id="2147483712" r:id="rId31"/>
+    <p:sldMasterId id="2147483714" r:id="rId32"/>
+    <p:sldMasterId id="2147483716" r:id="rId33"/>
+    <p:sldMasterId id="2147483718" r:id="rId34"/>
+    <p:sldMasterId id="2147483720" r:id="rId35"/>
   </p:sldMasterIdLst>
   <p:sldIdLst>
     <p:sldId id="256" r:id="rId36"/>
@@ -314,6 +314,333 @@
 </file>
 
 <file path=ppt/slideLayouts/slideLayout13.xml><?xml version="1.0" encoding="utf-8"?>
+<p:sldLayout xmlns:a="http://schemas.openxmlformats.org/drawingml/2006/main" xmlns:p="http://schemas.openxmlformats.org/presentationml/2006/main" xmlns:r="http://schemas.openxmlformats.org/officeDocument/2006/relationships" xmlns:p14="http://schemas.microsoft.com/office/powerpoint/2010/main" xmlns:p15="http://schemas.microsoft.com/office/powerpoint/2012/main" xmlns:mc="http://schemas.openxmlformats.org/markup-compatibility/2006" type="tx" preserve="1">
+  <p:cSld name="CUSTOM_10">
+    <p:spTree>
+      <p:nvGrpSpPr>
+        <p:cNvPr id="1" name=""/>
+        <p:cNvGrpSpPr/>
+        <p:nvPr/>
+      </p:nvGrpSpPr>
+      <p:grpSpPr>
+        <a:xfrm>
+          <a:off x="0" y="0"/>
+          <a:ext cx="0" cy="0"/>
+          <a:chOff x="0" y="0"/>
+          <a:chExt cx="0" cy="0"/>
+        </a:xfrm>
+      </p:grpSpPr>
+      <p:sp>
+        <p:nvSpPr>
+          <p:cNvPr id="65" name="PlaceHolder 1"/>
+          <p:cNvSpPr>
+            <a:spLocks noGrp="1"/>
+          </p:cNvSpPr>
+          <p:nvPr>
+            <p:ph type="title"/>
+          </p:nvPr>
+        </p:nvSpPr>
+        <p:spPr>
+          <a:xfrm>
+            <a:off x="457200" y="205200"/>
+            <a:ext cx="8229240" cy="858600"/>
+          </a:xfrm>
+          <a:prstGeom prst="rect">
+            <a:avLst/>
+          </a:prstGeom>
+          <a:noFill/>
+          <a:ln w="0">
+            <a:noFill/>
+          </a:ln>
+        </p:spPr>
+        <p:txBody>
+          <a:bodyPr lIns="0" rIns="0" tIns="0" bIns="0" anchor="ctr">
+            <a:spAutoFit/>
+          </a:bodyPr>
+          <a:p>
+            <a:pPr indent="0" algn="ctr">
+              <a:buNone/>
+            </a:pPr>
+            <a:endParaRPr b="0" lang="en-US" sz="4400" strike="noStrike" u="none">
+              <a:solidFill>
+                <a:srgbClr val="ffffff"/>
+              </a:solidFill>
+              <a:effectLst/>
+              <a:uFillTx/>
+              <a:latin typeface="Arial"/>
+            </a:endParaRPr>
+          </a:p>
+        </p:txBody>
+      </p:sp>
+      <p:sp>
+        <p:nvSpPr>
+          <p:cNvPr id="66" name="PlaceHolder 2"/>
+          <p:cNvSpPr>
+            <a:spLocks noGrp="1"/>
+          </p:cNvSpPr>
+          <p:nvPr>
+            <p:ph/>
+          </p:nvPr>
+        </p:nvSpPr>
+        <p:spPr>
+          <a:xfrm>
+            <a:off x="457200" y="1203480"/>
+            <a:ext cx="8229240" cy="2982960"/>
+          </a:xfrm>
+          <a:prstGeom prst="rect">
+            <a:avLst/>
+          </a:prstGeom>
+          <a:noFill/>
+          <a:ln w="0">
+            <a:noFill/>
+          </a:ln>
+        </p:spPr>
+        <p:txBody>
+          <a:bodyPr lIns="0" rIns="0" tIns="0" bIns="0" anchor="t">
+            <a:normAutofit/>
+          </a:bodyPr>
+          <a:p>
+            <a:pPr indent="0">
+              <a:spcBef>
+                <a:spcPts val="1417"/>
+              </a:spcBef>
+              <a:buNone/>
+            </a:pPr>
+            <a:endParaRPr b="0" lang="en-US" sz="3200" strike="noStrike" u="none">
+              <a:solidFill>
+                <a:srgbClr val="ffffff"/>
+              </a:solidFill>
+              <a:effectLst/>
+              <a:uFillTx/>
+              <a:latin typeface="Arial"/>
+            </a:endParaRPr>
+          </a:p>
+        </p:txBody>
+      </p:sp>
+    </p:spTree>
+  </p:cSld>
+</p:sldLayout>
+</file>
+
+<file path=ppt/slideLayouts/slideLayout14.xml><?xml version="1.0" encoding="utf-8"?>
+<p:sldLayout xmlns:a="http://schemas.openxmlformats.org/drawingml/2006/main" xmlns:p="http://schemas.openxmlformats.org/presentationml/2006/main" xmlns:r="http://schemas.openxmlformats.org/officeDocument/2006/relationships" xmlns:p14="http://schemas.microsoft.com/office/powerpoint/2010/main" xmlns:p15="http://schemas.microsoft.com/office/powerpoint/2012/main" xmlns:mc="http://schemas.openxmlformats.org/markup-compatibility/2006" type="titleOnly" preserve="1">
+  <p:cSld name="CUSTOM_10">
+    <p:spTree>
+      <p:nvGrpSpPr>
+        <p:cNvPr id="1" name=""/>
+        <p:cNvGrpSpPr/>
+        <p:nvPr/>
+      </p:nvGrpSpPr>
+      <p:grpSpPr>
+        <a:xfrm>
+          <a:off x="0" y="0"/>
+          <a:ext cx="0" cy="0"/>
+          <a:chOff x="0" y="0"/>
+          <a:chExt cx="0" cy="0"/>
+        </a:xfrm>
+      </p:grpSpPr>
+      <p:sp>
+        <p:nvSpPr>
+          <p:cNvPr id="67" name="PlaceHolder 1"/>
+          <p:cNvSpPr>
+            <a:spLocks noGrp="1"/>
+          </p:cNvSpPr>
+          <p:nvPr>
+            <p:ph type="title"/>
+          </p:nvPr>
+        </p:nvSpPr>
+        <p:spPr>
+          <a:xfrm>
+            <a:off x="457200" y="205200"/>
+            <a:ext cx="8229240" cy="858600"/>
+          </a:xfrm>
+          <a:prstGeom prst="rect">
+            <a:avLst/>
+          </a:prstGeom>
+          <a:noFill/>
+          <a:ln w="0">
+            <a:noFill/>
+          </a:ln>
+        </p:spPr>
+        <p:txBody>
+          <a:bodyPr lIns="0" rIns="0" tIns="0" bIns="0" anchor="ctr">
+            <a:spAutoFit/>
+          </a:bodyPr>
+          <a:p>
+            <a:pPr indent="0" algn="ctr">
+              <a:buNone/>
+            </a:pPr>
+            <a:endParaRPr b="0" lang="en-US" sz="4400" strike="noStrike" u="none">
+              <a:solidFill>
+                <a:srgbClr val="ffffff"/>
+              </a:solidFill>
+              <a:effectLst/>
+              <a:uFillTx/>
+              <a:latin typeface="Arial"/>
+            </a:endParaRPr>
+          </a:p>
+        </p:txBody>
+      </p:sp>
+    </p:spTree>
+  </p:cSld>
+</p:sldLayout>
+</file>
+
+<file path=ppt/slideLayouts/slideLayout15.xml><?xml version="1.0" encoding="utf-8"?>
+<p:sldLayout xmlns:a="http://schemas.openxmlformats.org/drawingml/2006/main" xmlns:p="http://schemas.openxmlformats.org/presentationml/2006/main" xmlns:r="http://schemas.openxmlformats.org/officeDocument/2006/relationships" xmlns:p14="http://schemas.microsoft.com/office/powerpoint/2010/main" xmlns:p15="http://schemas.microsoft.com/office/powerpoint/2012/main" xmlns:mc="http://schemas.openxmlformats.org/markup-compatibility/2006" type="twoObj" preserve="1">
+  <p:cSld name="CUSTOM_10">
+    <p:spTree>
+      <p:nvGrpSpPr>
+        <p:cNvPr id="1" name=""/>
+        <p:cNvGrpSpPr/>
+        <p:nvPr/>
+      </p:nvGrpSpPr>
+      <p:grpSpPr>
+        <a:xfrm>
+          <a:off x="0" y="0"/>
+          <a:ext cx="0" cy="0"/>
+          <a:chOff x="0" y="0"/>
+          <a:chExt cx="0" cy="0"/>
+        </a:xfrm>
+      </p:grpSpPr>
+      <p:sp>
+        <p:nvSpPr>
+          <p:cNvPr id="68" name="PlaceHolder 1"/>
+          <p:cNvSpPr>
+            <a:spLocks noGrp="1"/>
+          </p:cNvSpPr>
+          <p:nvPr>
+            <p:ph type="title"/>
+          </p:nvPr>
+        </p:nvSpPr>
+        <p:spPr>
+          <a:xfrm>
+            <a:off x="457200" y="205200"/>
+            <a:ext cx="8229240" cy="858600"/>
+          </a:xfrm>
+          <a:prstGeom prst="rect">
+            <a:avLst/>
+          </a:prstGeom>
+          <a:noFill/>
+          <a:ln w="0">
+            <a:noFill/>
+          </a:ln>
+        </p:spPr>
+        <p:txBody>
+          <a:bodyPr lIns="0" rIns="0" tIns="0" bIns="0" anchor="ctr">
+            <a:spAutoFit/>
+          </a:bodyPr>
+          <a:p>
+            <a:pPr indent="0" algn="ctr">
+              <a:buNone/>
+            </a:pPr>
+            <a:endParaRPr b="0" lang="en-US" sz="4400" strike="noStrike" u="none">
+              <a:solidFill>
+                <a:srgbClr val="ffffff"/>
+              </a:solidFill>
+              <a:effectLst/>
+              <a:uFillTx/>
+              <a:latin typeface="Arial"/>
+            </a:endParaRPr>
+          </a:p>
+        </p:txBody>
+      </p:sp>
+      <p:sp>
+        <p:nvSpPr>
+          <p:cNvPr id="69" name="PlaceHolder 2"/>
+          <p:cNvSpPr>
+            <a:spLocks noGrp="1"/>
+          </p:cNvSpPr>
+          <p:nvPr>
+            <p:ph/>
+          </p:nvPr>
+        </p:nvSpPr>
+        <p:spPr>
+          <a:xfrm>
+            <a:off x="457200" y="1203480"/>
+            <a:ext cx="4015800" cy="2982960"/>
+          </a:xfrm>
+          <a:prstGeom prst="rect">
+            <a:avLst/>
+          </a:prstGeom>
+          <a:noFill/>
+          <a:ln w="0">
+            <a:noFill/>
+          </a:ln>
+        </p:spPr>
+        <p:txBody>
+          <a:bodyPr lIns="0" rIns="0" tIns="0" bIns="0" anchor="t">
+            <a:normAutofit/>
+          </a:bodyPr>
+          <a:p>
+            <a:pPr indent="0">
+              <a:spcBef>
+                <a:spcPts val="1417"/>
+              </a:spcBef>
+              <a:buNone/>
+            </a:pPr>
+            <a:endParaRPr b="0" lang="en-US" sz="3200" strike="noStrike" u="none">
+              <a:solidFill>
+                <a:srgbClr val="ffffff"/>
+              </a:solidFill>
+              <a:effectLst/>
+              <a:uFillTx/>
+              <a:latin typeface="Arial"/>
+            </a:endParaRPr>
+          </a:p>
+        </p:txBody>
+      </p:sp>
+      <p:sp>
+        <p:nvSpPr>
+          <p:cNvPr id="70" name="PlaceHolder 3"/>
+          <p:cNvSpPr>
+            <a:spLocks noGrp="1"/>
+          </p:cNvSpPr>
+          <p:nvPr>
+            <p:ph/>
+          </p:nvPr>
+        </p:nvSpPr>
+        <p:spPr>
+          <a:xfrm>
+            <a:off x="4674240" y="1203480"/>
+            <a:ext cx="4015800" cy="2982960"/>
+          </a:xfrm>
+          <a:prstGeom prst="rect">
+            <a:avLst/>
+          </a:prstGeom>
+          <a:noFill/>
+          <a:ln w="0">
+            <a:noFill/>
+          </a:ln>
+        </p:spPr>
+        <p:txBody>
+          <a:bodyPr lIns="0" rIns="0" tIns="0" bIns="0" anchor="t">
+            <a:normAutofit/>
+          </a:bodyPr>
+          <a:p>
+            <a:pPr indent="0">
+              <a:spcBef>
+                <a:spcPts val="1417"/>
+              </a:spcBef>
+              <a:buNone/>
+            </a:pPr>
+            <a:endParaRPr b="0" lang="en-US" sz="3200" strike="noStrike" u="none">
+              <a:solidFill>
+                <a:srgbClr val="ffffff"/>
+              </a:solidFill>
+              <a:effectLst/>
+              <a:uFillTx/>
+              <a:latin typeface="Arial"/>
+            </a:endParaRPr>
+          </a:p>
+        </p:txBody>
+      </p:sp>
+    </p:spTree>
+  </p:cSld>
+</p:sldLayout>
+</file>
+
+<file path=ppt/slideLayouts/slideLayout16.xml><?xml version="1.0" encoding="utf-8"?>
 <p:sldLayout xmlns:a="http://schemas.openxmlformats.org/drawingml/2006/main" xmlns:p="http://schemas.openxmlformats.org/presentationml/2006/main" xmlns:r="http://schemas.openxmlformats.org/officeDocument/2006/relationships" xmlns:p14="http://schemas.microsoft.com/office/powerpoint/2010/main" xmlns:p15="http://schemas.microsoft.com/office/powerpoint/2012/main" xmlns:mc="http://schemas.openxmlformats.org/markup-compatibility/2006" type="blank" preserve="1">
   <p:cSld name="SECTION_HEADER">
     <p:spTree>
@@ -335,7 +662,7 @@
 </p:sldLayout>
 </file>
 
-<file path=ppt/slideLayouts/slideLayout14.xml><?xml version="1.0" encoding="utf-8"?>
+<file path=ppt/slideLayouts/slideLayout17.xml><?xml version="1.0" encoding="utf-8"?>
 <p:sldLayout xmlns:a="http://schemas.openxmlformats.org/drawingml/2006/main" xmlns:p="http://schemas.openxmlformats.org/presentationml/2006/main" xmlns:r="http://schemas.openxmlformats.org/officeDocument/2006/relationships" xmlns:p14="http://schemas.microsoft.com/office/powerpoint/2010/main" xmlns:p15="http://schemas.microsoft.com/office/powerpoint/2012/main" xmlns:mc="http://schemas.openxmlformats.org/markup-compatibility/2006" type="blank" preserve="1">
   <p:cSld name="CUSTOM_4">
     <p:spTree>
@@ -357,7 +684,7 @@
 </p:sldLayout>
 </file>
 
-<file path=ppt/slideLayouts/slideLayout15.xml><?xml version="1.0" encoding="utf-8"?>
+<file path=ppt/slideLayouts/slideLayout18.xml><?xml version="1.0" encoding="utf-8"?>
 <p:sldLayout xmlns:a="http://schemas.openxmlformats.org/drawingml/2006/main" xmlns:p="http://schemas.openxmlformats.org/presentationml/2006/main" xmlns:r="http://schemas.openxmlformats.org/officeDocument/2006/relationships" xmlns:p14="http://schemas.microsoft.com/office/powerpoint/2010/main" xmlns:p15="http://schemas.microsoft.com/office/powerpoint/2012/main" xmlns:mc="http://schemas.openxmlformats.org/markup-compatibility/2006" type="blank" preserve="1">
   <p:cSld name="CUSTOM_4_1">
     <p:spTree>
@@ -379,75 +706,9 @@
 </p:sldLayout>
 </file>
 
-<file path=ppt/slideLayouts/slideLayout16.xml><?xml version="1.0" encoding="utf-8"?>
+<file path=ppt/slideLayouts/slideLayout19.xml><?xml version="1.0" encoding="utf-8"?>
 <p:sldLayout xmlns:a="http://schemas.openxmlformats.org/drawingml/2006/main" xmlns:p="http://schemas.openxmlformats.org/presentationml/2006/main" xmlns:r="http://schemas.openxmlformats.org/officeDocument/2006/relationships" xmlns:p14="http://schemas.microsoft.com/office/powerpoint/2010/main" xmlns:p15="http://schemas.microsoft.com/office/powerpoint/2012/main" xmlns:mc="http://schemas.openxmlformats.org/markup-compatibility/2006" type="blank" preserve="1">
   <p:cSld name="TITLE_AND_TWO_COLUMNS_1">
-    <p:spTree>
-      <p:nvGrpSpPr>
-        <p:cNvPr id="1" name=""/>
-        <p:cNvGrpSpPr/>
-        <p:nvPr/>
-      </p:nvGrpSpPr>
-      <p:grpSpPr>
-        <a:xfrm>
-          <a:off x="0" y="0"/>
-          <a:ext cx="0" cy="0"/>
-          <a:chOff x="0" y="0"/>
-          <a:chExt cx="0" cy="0"/>
-        </a:xfrm>
-      </p:grpSpPr>
-    </p:spTree>
-  </p:cSld>
-</p:sldLayout>
-</file>
-
-<file path=ppt/slideLayouts/slideLayout17.xml><?xml version="1.0" encoding="utf-8"?>
-<p:sldLayout xmlns:a="http://schemas.openxmlformats.org/drawingml/2006/main" xmlns:p="http://schemas.openxmlformats.org/presentationml/2006/main" xmlns:r="http://schemas.openxmlformats.org/officeDocument/2006/relationships" xmlns:p14="http://schemas.microsoft.com/office/powerpoint/2010/main" xmlns:p15="http://schemas.microsoft.com/office/powerpoint/2012/main" xmlns:mc="http://schemas.openxmlformats.org/markup-compatibility/2006" type="blank" preserve="1">
-  <p:cSld name="TITLE_AND_TWO_COLUMNS_1_1">
-    <p:spTree>
-      <p:nvGrpSpPr>
-        <p:cNvPr id="1" name=""/>
-        <p:cNvGrpSpPr/>
-        <p:nvPr/>
-      </p:nvGrpSpPr>
-      <p:grpSpPr>
-        <a:xfrm>
-          <a:off x="0" y="0"/>
-          <a:ext cx="0" cy="0"/>
-          <a:chOff x="0" y="0"/>
-          <a:chExt cx="0" cy="0"/>
-        </a:xfrm>
-      </p:grpSpPr>
-    </p:spTree>
-  </p:cSld>
-</p:sldLayout>
-</file>
-
-<file path=ppt/slideLayouts/slideLayout18.xml><?xml version="1.0" encoding="utf-8"?>
-<p:sldLayout xmlns:a="http://schemas.openxmlformats.org/drawingml/2006/main" xmlns:p="http://schemas.openxmlformats.org/presentationml/2006/main" xmlns:r="http://schemas.openxmlformats.org/officeDocument/2006/relationships" xmlns:p14="http://schemas.microsoft.com/office/powerpoint/2010/main" xmlns:p15="http://schemas.microsoft.com/office/powerpoint/2012/main" xmlns:mc="http://schemas.openxmlformats.org/markup-compatibility/2006" type="blank" preserve="1">
-  <p:cSld name="CUSTOM_6">
-    <p:spTree>
-      <p:nvGrpSpPr>
-        <p:cNvPr id="1" name=""/>
-        <p:cNvGrpSpPr/>
-        <p:nvPr/>
-      </p:nvGrpSpPr>
-      <p:grpSpPr>
-        <a:xfrm>
-          <a:off x="0" y="0"/>
-          <a:ext cx="0" cy="0"/>
-          <a:chOff x="0" y="0"/>
-          <a:chExt cx="0" cy="0"/>
-        </a:xfrm>
-      </p:grpSpPr>
-    </p:spTree>
-  </p:cSld>
-</p:sldLayout>
-</file>
-
-<file path=ppt/slideLayouts/slideLayout19.xml><?xml version="1.0" encoding="utf-8"?>
-<p:sldLayout xmlns:a="http://schemas.openxmlformats.org/drawingml/2006/main" xmlns:p="http://schemas.openxmlformats.org/presentationml/2006/main" xmlns:r="http://schemas.openxmlformats.org/officeDocument/2006/relationships" xmlns:p14="http://schemas.microsoft.com/office/powerpoint/2010/main" xmlns:p15="http://schemas.microsoft.com/office/powerpoint/2012/main" xmlns:mc="http://schemas.openxmlformats.org/markup-compatibility/2006" type="blank" preserve="1">
-  <p:cSld name="CUSTOM_5">
     <p:spTree>
       <p:nvGrpSpPr>
         <p:cNvPr id="1" name=""/>
@@ -491,7 +752,7 @@
 
 <file path=ppt/slideLayouts/slideLayout20.xml><?xml version="1.0" encoding="utf-8"?>
 <p:sldLayout xmlns:a="http://schemas.openxmlformats.org/drawingml/2006/main" xmlns:p="http://schemas.openxmlformats.org/presentationml/2006/main" xmlns:r="http://schemas.openxmlformats.org/officeDocument/2006/relationships" xmlns:p14="http://schemas.microsoft.com/office/powerpoint/2010/main" xmlns:p15="http://schemas.microsoft.com/office/powerpoint/2012/main" xmlns:mc="http://schemas.openxmlformats.org/markup-compatibility/2006" type="blank" preserve="1">
-  <p:cSld name="CUSTOM_7">
+  <p:cSld name="TITLE_AND_TWO_COLUMNS_1_1">
     <p:spTree>
       <p:nvGrpSpPr>
         <p:cNvPr id="1" name=""/>
@@ -513,7 +774,7 @@
 
 <file path=ppt/slideLayouts/slideLayout21.xml><?xml version="1.0" encoding="utf-8"?>
 <p:sldLayout xmlns:a="http://schemas.openxmlformats.org/drawingml/2006/main" xmlns:p="http://schemas.openxmlformats.org/presentationml/2006/main" xmlns:r="http://schemas.openxmlformats.org/officeDocument/2006/relationships" xmlns:p14="http://schemas.microsoft.com/office/powerpoint/2010/main" xmlns:p15="http://schemas.microsoft.com/office/powerpoint/2012/main" xmlns:mc="http://schemas.openxmlformats.org/markup-compatibility/2006" type="blank" preserve="1">
-  <p:cSld name="CUSTOM_8">
+  <p:cSld name="CUSTOM_6">
     <p:spTree>
       <p:nvGrpSpPr>
         <p:cNvPr id="1" name=""/>
@@ -535,7 +796,7 @@
 
 <file path=ppt/slideLayouts/slideLayout22.xml><?xml version="1.0" encoding="utf-8"?>
 <p:sldLayout xmlns:a="http://schemas.openxmlformats.org/drawingml/2006/main" xmlns:p="http://schemas.openxmlformats.org/presentationml/2006/main" xmlns:r="http://schemas.openxmlformats.org/officeDocument/2006/relationships" xmlns:p14="http://schemas.microsoft.com/office/powerpoint/2010/main" xmlns:p15="http://schemas.microsoft.com/office/powerpoint/2012/main" xmlns:mc="http://schemas.openxmlformats.org/markup-compatibility/2006" type="blank" preserve="1">
-  <p:cSld name="CUSTOM_8_1">
+  <p:cSld name="CUSTOM_5">
     <p:spTree>
       <p:nvGrpSpPr>
         <p:cNvPr id="1" name=""/>
@@ -557,6 +818,72 @@
 
 <file path=ppt/slideLayouts/slideLayout23.xml><?xml version="1.0" encoding="utf-8"?>
 <p:sldLayout xmlns:a="http://schemas.openxmlformats.org/drawingml/2006/main" xmlns:p="http://schemas.openxmlformats.org/presentationml/2006/main" xmlns:r="http://schemas.openxmlformats.org/officeDocument/2006/relationships" xmlns:p14="http://schemas.microsoft.com/office/powerpoint/2010/main" xmlns:p15="http://schemas.microsoft.com/office/powerpoint/2012/main" xmlns:mc="http://schemas.openxmlformats.org/markup-compatibility/2006" type="blank" preserve="1">
+  <p:cSld name="CUSTOM_7">
+    <p:spTree>
+      <p:nvGrpSpPr>
+        <p:cNvPr id="1" name=""/>
+        <p:cNvGrpSpPr/>
+        <p:nvPr/>
+      </p:nvGrpSpPr>
+      <p:grpSpPr>
+        <a:xfrm>
+          <a:off x="0" y="0"/>
+          <a:ext cx="0" cy="0"/>
+          <a:chOff x="0" y="0"/>
+          <a:chExt cx="0" cy="0"/>
+        </a:xfrm>
+      </p:grpSpPr>
+    </p:spTree>
+  </p:cSld>
+</p:sldLayout>
+</file>
+
+<file path=ppt/slideLayouts/slideLayout24.xml><?xml version="1.0" encoding="utf-8"?>
+<p:sldLayout xmlns:a="http://schemas.openxmlformats.org/drawingml/2006/main" xmlns:p="http://schemas.openxmlformats.org/presentationml/2006/main" xmlns:r="http://schemas.openxmlformats.org/officeDocument/2006/relationships" xmlns:p14="http://schemas.microsoft.com/office/powerpoint/2010/main" xmlns:p15="http://schemas.microsoft.com/office/powerpoint/2012/main" xmlns:mc="http://schemas.openxmlformats.org/markup-compatibility/2006" type="blank" preserve="1">
+  <p:cSld name="CUSTOM_8">
+    <p:spTree>
+      <p:nvGrpSpPr>
+        <p:cNvPr id="1" name=""/>
+        <p:cNvGrpSpPr/>
+        <p:nvPr/>
+      </p:nvGrpSpPr>
+      <p:grpSpPr>
+        <a:xfrm>
+          <a:off x="0" y="0"/>
+          <a:ext cx="0" cy="0"/>
+          <a:chOff x="0" y="0"/>
+          <a:chExt cx="0" cy="0"/>
+        </a:xfrm>
+      </p:grpSpPr>
+    </p:spTree>
+  </p:cSld>
+</p:sldLayout>
+</file>
+
+<file path=ppt/slideLayouts/slideLayout25.xml><?xml version="1.0" encoding="utf-8"?>
+<p:sldLayout xmlns:a="http://schemas.openxmlformats.org/drawingml/2006/main" xmlns:p="http://schemas.openxmlformats.org/presentationml/2006/main" xmlns:r="http://schemas.openxmlformats.org/officeDocument/2006/relationships" xmlns:p14="http://schemas.microsoft.com/office/powerpoint/2010/main" xmlns:p15="http://schemas.microsoft.com/office/powerpoint/2012/main" xmlns:mc="http://schemas.openxmlformats.org/markup-compatibility/2006" type="blank" preserve="1">
+  <p:cSld name="CUSTOM_8_1">
+    <p:spTree>
+      <p:nvGrpSpPr>
+        <p:cNvPr id="1" name=""/>
+        <p:cNvGrpSpPr/>
+        <p:nvPr/>
+      </p:nvGrpSpPr>
+      <p:grpSpPr>
+        <a:xfrm>
+          <a:off x="0" y="0"/>
+          <a:ext cx="0" cy="0"/>
+          <a:chOff x="0" y="0"/>
+          <a:chExt cx="0" cy="0"/>
+        </a:xfrm>
+      </p:grpSpPr>
+    </p:spTree>
+  </p:cSld>
+</p:sldLayout>
+</file>
+
+<file path=ppt/slideLayouts/slideLayout26.xml><?xml version="1.0" encoding="utf-8"?>
+<p:sldLayout xmlns:a="http://schemas.openxmlformats.org/drawingml/2006/main" xmlns:p="http://schemas.openxmlformats.org/presentationml/2006/main" xmlns:r="http://schemas.openxmlformats.org/officeDocument/2006/relationships" xmlns:p14="http://schemas.microsoft.com/office/powerpoint/2010/main" xmlns:p15="http://schemas.microsoft.com/office/powerpoint/2012/main" xmlns:mc="http://schemas.openxmlformats.org/markup-compatibility/2006" type="blank" preserve="1">
   <p:cSld name="CUSTOM_8_1_1">
     <p:spTree>
       <p:nvGrpSpPr>
@@ -577,7 +904,7 @@
 </p:sldLayout>
 </file>
 
-<file path=ppt/slideLayouts/slideLayout24.xml><?xml version="1.0" encoding="utf-8"?>
+<file path=ppt/slideLayouts/slideLayout27.xml><?xml version="1.0" encoding="utf-8"?>
 <p:sldLayout xmlns:a="http://schemas.openxmlformats.org/drawingml/2006/main" xmlns:p="http://schemas.openxmlformats.org/presentationml/2006/main" xmlns:r="http://schemas.openxmlformats.org/officeDocument/2006/relationships" xmlns:p14="http://schemas.microsoft.com/office/powerpoint/2010/main" xmlns:p15="http://schemas.microsoft.com/office/powerpoint/2012/main" xmlns:mc="http://schemas.openxmlformats.org/markup-compatibility/2006" type="tx" preserve="1">
   <p:cSld name="TITLE_AND_BODY">
     <p:spTree>
@@ -596,7 +923,7 @@
       </p:grpSpPr>
       <p:sp>
         <p:nvSpPr>
-          <p:cNvPr id="131" name="PlaceHolder 1"/>
+          <p:cNvPr id="137" name="PlaceHolder 1"/>
           <p:cNvSpPr>
             <a:spLocks noGrp="1"/>
           </p:cNvSpPr>
@@ -638,7 +965,7 @@
       </p:sp>
       <p:sp>
         <p:nvSpPr>
-          <p:cNvPr id="132" name="PlaceHolder 2"/>
+          <p:cNvPr id="138" name="PlaceHolder 2"/>
           <p:cNvSpPr>
             <a:spLocks noGrp="1"/>
           </p:cNvSpPr>
@@ -686,7 +1013,7 @@
 </p:sldLayout>
 </file>
 
-<file path=ppt/slideLayouts/slideLayout25.xml><?xml version="1.0" encoding="utf-8"?>
+<file path=ppt/slideLayouts/slideLayout28.xml><?xml version="1.0" encoding="utf-8"?>
 <p:sldLayout xmlns:a="http://schemas.openxmlformats.org/drawingml/2006/main" xmlns:p="http://schemas.openxmlformats.org/presentationml/2006/main" xmlns:r="http://schemas.openxmlformats.org/officeDocument/2006/relationships" xmlns:p14="http://schemas.microsoft.com/office/powerpoint/2010/main" xmlns:p15="http://schemas.microsoft.com/office/powerpoint/2012/main" xmlns:mc="http://schemas.openxmlformats.org/markup-compatibility/2006" type="blank" preserve="1">
   <p:cSld name="CUSTOM_3_1">
     <p:bg>
@@ -712,7 +1039,7 @@
       </p:grpSpPr>
       <p:sp>
         <p:nvSpPr>
-          <p:cNvPr id="133" name="Google Shape;293;p31"/>
+          <p:cNvPr id="139" name="Google Shape;293;p31"/>
           <p:cNvSpPr/>
           <p:nvPr/>
         </p:nvSpPr>
@@ -854,7 +1181,7 @@
 </p:sldLayout>
 </file>
 
-<file path=ppt/slideLayouts/slideLayout26.xml><?xml version="1.0" encoding="utf-8"?>
+<file path=ppt/slideLayouts/slideLayout29.xml><?xml version="1.0" encoding="utf-8"?>
 <p:sldLayout xmlns:a="http://schemas.openxmlformats.org/drawingml/2006/main" xmlns:p="http://schemas.openxmlformats.org/presentationml/2006/main" xmlns:r="http://schemas.openxmlformats.org/officeDocument/2006/relationships" xmlns:p14="http://schemas.microsoft.com/office/powerpoint/2010/main" xmlns:p15="http://schemas.microsoft.com/office/powerpoint/2012/main" xmlns:mc="http://schemas.openxmlformats.org/markup-compatibility/2006" type="title" preserve="1">
   <p:cSld name="Default">
     <p:bg>
@@ -880,7 +1207,7 @@
       </p:grpSpPr>
       <p:sp>
         <p:nvSpPr>
-          <p:cNvPr id="134" name="Google Shape;293;p31"/>
+          <p:cNvPr id="140" name="Google Shape;293;p31"/>
           <p:cNvSpPr/>
           <p:nvPr/>
         </p:nvSpPr>
@@ -1019,7 +1346,7 @@
       </p:sp>
       <p:sp>
         <p:nvSpPr>
-          <p:cNvPr id="135" name="PlaceHolder 1"/>
+          <p:cNvPr id="141" name="PlaceHolder 1"/>
           <p:cNvSpPr>
             <a:spLocks noGrp="1"/>
           </p:cNvSpPr>
@@ -1075,7 +1402,29 @@
 </p:sldLayout>
 </file>
 
-<file path=ppt/slideLayouts/slideLayout27.xml><?xml version="1.0" encoding="utf-8"?>
+<file path=ppt/slideLayouts/slideLayout3.xml><?xml version="1.0" encoding="utf-8"?>
+<p:sldLayout xmlns:a="http://schemas.openxmlformats.org/drawingml/2006/main" xmlns:p="http://schemas.openxmlformats.org/presentationml/2006/main" xmlns:r="http://schemas.openxmlformats.org/officeDocument/2006/relationships" xmlns:p14="http://schemas.microsoft.com/office/powerpoint/2010/main" xmlns:p15="http://schemas.microsoft.com/office/powerpoint/2012/main" xmlns:mc="http://schemas.openxmlformats.org/markup-compatibility/2006" type="blank" preserve="1">
+  <p:cSld name="BLANK">
+    <p:spTree>
+      <p:nvGrpSpPr>
+        <p:cNvPr id="1" name=""/>
+        <p:cNvGrpSpPr/>
+        <p:nvPr/>
+      </p:nvGrpSpPr>
+      <p:grpSpPr>
+        <a:xfrm>
+          <a:off x="0" y="0"/>
+          <a:ext cx="0" cy="0"/>
+          <a:chOff x="0" y="0"/>
+          <a:chExt cx="0" cy="0"/>
+        </a:xfrm>
+      </p:grpSpPr>
+    </p:spTree>
+  </p:cSld>
+</p:sldLayout>
+</file>
+
+<file path=ppt/slideLayouts/slideLayout30.xml><?xml version="1.0" encoding="utf-8"?>
 <p:sldLayout xmlns:a="http://schemas.openxmlformats.org/drawingml/2006/main" xmlns:p="http://schemas.openxmlformats.org/presentationml/2006/main" xmlns:r="http://schemas.openxmlformats.org/officeDocument/2006/relationships" xmlns:p14="http://schemas.microsoft.com/office/powerpoint/2010/main" xmlns:p15="http://schemas.microsoft.com/office/powerpoint/2012/main" xmlns:mc="http://schemas.openxmlformats.org/markup-compatibility/2006" type="tx" preserve="1">
   <p:cSld name="Default 1">
     <p:bg>
@@ -1101,7 +1450,7 @@
       </p:grpSpPr>
       <p:sp>
         <p:nvSpPr>
-          <p:cNvPr id="136" name="Google Shape;293;p31"/>
+          <p:cNvPr id="142" name="Google Shape;293;p31"/>
           <p:cNvSpPr/>
           <p:nvPr/>
         </p:nvSpPr>
@@ -1240,7 +1589,7 @@
       </p:sp>
       <p:sp>
         <p:nvSpPr>
-          <p:cNvPr id="137" name="PlaceHolder 1"/>
+          <p:cNvPr id="143" name="PlaceHolder 1"/>
           <p:cNvSpPr>
             <a:spLocks noGrp="1"/>
           </p:cNvSpPr>
@@ -1293,7 +1642,7 @@
       </p:sp>
       <p:sp>
         <p:nvSpPr>
-          <p:cNvPr id="138" name="PlaceHolder 2"/>
+          <p:cNvPr id="144" name="PlaceHolder 2"/>
           <p:cNvSpPr>
             <a:spLocks noGrp="1"/>
           </p:cNvSpPr>
@@ -1549,7 +1898,7 @@
 </p:sldLayout>
 </file>
 
-<file path=ppt/slideLayouts/slideLayout28.xml><?xml version="1.0" encoding="utf-8"?>
+<file path=ppt/slideLayouts/slideLayout31.xml><?xml version="1.0" encoding="utf-8"?>
 <p:sldLayout xmlns:a="http://schemas.openxmlformats.org/drawingml/2006/main" xmlns:p="http://schemas.openxmlformats.org/presentationml/2006/main" xmlns:r="http://schemas.openxmlformats.org/officeDocument/2006/relationships" xmlns:p14="http://schemas.microsoft.com/office/powerpoint/2010/main" xmlns:p15="http://schemas.microsoft.com/office/powerpoint/2012/main" xmlns:mc="http://schemas.openxmlformats.org/markup-compatibility/2006" type="blank" preserve="1">
   <p:cSld name="CUSTOM_9">
     <p:spTree>
@@ -1571,7 +1920,7 @@
 </p:sldLayout>
 </file>
 
-<file path=ppt/slideLayouts/slideLayout29.xml><?xml version="1.0" encoding="utf-8"?>
+<file path=ppt/slideLayouts/slideLayout32.xml><?xml version="1.0" encoding="utf-8"?>
 <p:sldLayout xmlns:a="http://schemas.openxmlformats.org/drawingml/2006/main" xmlns:p="http://schemas.openxmlformats.org/presentationml/2006/main" xmlns:r="http://schemas.openxmlformats.org/officeDocument/2006/relationships" xmlns:p14="http://schemas.microsoft.com/office/powerpoint/2010/main" xmlns:p15="http://schemas.microsoft.com/office/powerpoint/2012/main" xmlns:mc="http://schemas.openxmlformats.org/markup-compatibility/2006" type="blank" preserve="1">
   <p:cSld name="CUSTOM_9_1">
     <p:spTree>
@@ -1593,29 +1942,7 @@
 </p:sldLayout>
 </file>
 
-<file path=ppt/slideLayouts/slideLayout3.xml><?xml version="1.0" encoding="utf-8"?>
-<p:sldLayout xmlns:a="http://schemas.openxmlformats.org/drawingml/2006/main" xmlns:p="http://schemas.openxmlformats.org/presentationml/2006/main" xmlns:r="http://schemas.openxmlformats.org/officeDocument/2006/relationships" xmlns:p14="http://schemas.microsoft.com/office/powerpoint/2010/main" xmlns:p15="http://schemas.microsoft.com/office/powerpoint/2012/main" xmlns:mc="http://schemas.openxmlformats.org/markup-compatibility/2006" type="blank" preserve="1">
-  <p:cSld name="BLANK">
-    <p:spTree>
-      <p:nvGrpSpPr>
-        <p:cNvPr id="1" name=""/>
-        <p:cNvGrpSpPr/>
-        <p:nvPr/>
-      </p:nvGrpSpPr>
-      <p:grpSpPr>
-        <a:xfrm>
-          <a:off x="0" y="0"/>
-          <a:ext cx="0" cy="0"/>
-          <a:chOff x="0" y="0"/>
-          <a:chExt cx="0" cy="0"/>
-        </a:xfrm>
-      </p:grpSpPr>
-    </p:spTree>
-  </p:cSld>
-</p:sldLayout>
-</file>
-
-<file path=ppt/slideLayouts/slideLayout30.xml><?xml version="1.0" encoding="utf-8"?>
+<file path=ppt/slideLayouts/slideLayout33.xml><?xml version="1.0" encoding="utf-8"?>
 <p:sldLayout xmlns:a="http://schemas.openxmlformats.org/drawingml/2006/main" xmlns:p="http://schemas.openxmlformats.org/presentationml/2006/main" xmlns:r="http://schemas.openxmlformats.org/officeDocument/2006/relationships" xmlns:p14="http://schemas.microsoft.com/office/powerpoint/2010/main" xmlns:p15="http://schemas.microsoft.com/office/powerpoint/2012/main" xmlns:mc="http://schemas.openxmlformats.org/markup-compatibility/2006" type="twoObj" preserve="1">
   <p:cSld name="TITLE_AND_TWO_COLUMNS">
     <p:spTree>
@@ -1634,7 +1961,7 @@
       </p:grpSpPr>
       <p:sp>
         <p:nvSpPr>
-          <p:cNvPr id="161" name="PlaceHolder 1"/>
+          <p:cNvPr id="167" name="PlaceHolder 1"/>
           <p:cNvSpPr>
             <a:spLocks noGrp="1"/>
           </p:cNvSpPr>
@@ -1676,7 +2003,7 @@
       </p:sp>
       <p:sp>
         <p:nvSpPr>
-          <p:cNvPr id="162" name="PlaceHolder 2"/>
+          <p:cNvPr id="168" name="PlaceHolder 2"/>
           <p:cNvSpPr>
             <a:spLocks noGrp="1"/>
           </p:cNvSpPr>
@@ -1721,7 +2048,7 @@
       </p:sp>
       <p:sp>
         <p:nvSpPr>
-          <p:cNvPr id="163" name="PlaceHolder 3"/>
+          <p:cNvPr id="169" name="PlaceHolder 3"/>
           <p:cNvSpPr>
             <a:spLocks noGrp="1"/>
           </p:cNvSpPr>
@@ -1769,7 +2096,7 @@
 </p:sldLayout>
 </file>
 
-<file path=ppt/slideLayouts/slideLayout31.xml><?xml version="1.0" encoding="utf-8"?>
+<file path=ppt/slideLayouts/slideLayout34.xml><?xml version="1.0" encoding="utf-8"?>
 <p:sldLayout xmlns:a="http://schemas.openxmlformats.org/drawingml/2006/main" xmlns:p="http://schemas.openxmlformats.org/presentationml/2006/main" xmlns:r="http://schemas.openxmlformats.org/officeDocument/2006/relationships" xmlns:p14="http://schemas.microsoft.com/office/powerpoint/2010/main" xmlns:p15="http://schemas.microsoft.com/office/powerpoint/2012/main" xmlns:mc="http://schemas.openxmlformats.org/markup-compatibility/2006" type="titleOnly" preserve="1">
   <p:cSld name="TITLE_ONLY">
     <p:spTree>
@@ -1788,7 +2115,7 @@
       </p:grpSpPr>
       <p:sp>
         <p:nvSpPr>
-          <p:cNvPr id="173" name="PlaceHolder 1"/>
+          <p:cNvPr id="179" name="PlaceHolder 1"/>
           <p:cNvSpPr>
             <a:spLocks noGrp="1"/>
           </p:cNvSpPr>
@@ -1833,7 +2160,7 @@
 </p:sldLayout>
 </file>
 
-<file path=ppt/slideLayouts/slideLayout32.xml><?xml version="1.0" encoding="utf-8"?>
+<file path=ppt/slideLayouts/slideLayout35.xml><?xml version="1.0" encoding="utf-8"?>
 <p:sldLayout xmlns:a="http://schemas.openxmlformats.org/drawingml/2006/main" xmlns:p="http://schemas.openxmlformats.org/presentationml/2006/main" xmlns:r="http://schemas.openxmlformats.org/officeDocument/2006/relationships" xmlns:p14="http://schemas.microsoft.com/office/powerpoint/2010/main" xmlns:p15="http://schemas.microsoft.com/office/powerpoint/2012/main" xmlns:mc="http://schemas.openxmlformats.org/markup-compatibility/2006" type="blank" preserve="1">
   <p:cSld name="ONE_COLUMN_TEXT">
     <p:spTree>
@@ -1855,7 +2182,7 @@
 </p:sldLayout>
 </file>
 
-<file path=ppt/slideLayouts/slideLayout33.xml><?xml version="1.0" encoding="utf-8"?>
+<file path=ppt/slideLayouts/slideLayout36.xml><?xml version="1.0" encoding="utf-8"?>
 <p:sldLayout xmlns:a="http://schemas.openxmlformats.org/drawingml/2006/main" xmlns:p="http://schemas.openxmlformats.org/presentationml/2006/main" xmlns:r="http://schemas.openxmlformats.org/officeDocument/2006/relationships" xmlns:p14="http://schemas.microsoft.com/office/powerpoint/2010/main" xmlns:p15="http://schemas.microsoft.com/office/powerpoint/2012/main" xmlns:mc="http://schemas.openxmlformats.org/markup-compatibility/2006" type="blank" preserve="1">
   <p:cSld name="MAIN_POINT">
     <p:spTree>
@@ -1877,7 +2204,7 @@
 </p:sldLayout>
 </file>
 
-<file path=ppt/slideLayouts/slideLayout34.xml><?xml version="1.0" encoding="utf-8"?>
+<file path=ppt/slideLayouts/slideLayout37.xml><?xml version="1.0" encoding="utf-8"?>
 <p:sldLayout xmlns:a="http://schemas.openxmlformats.org/drawingml/2006/main" xmlns:p="http://schemas.openxmlformats.org/presentationml/2006/main" xmlns:r="http://schemas.openxmlformats.org/officeDocument/2006/relationships" xmlns:p14="http://schemas.microsoft.com/office/powerpoint/2010/main" xmlns:p15="http://schemas.microsoft.com/office/powerpoint/2012/main" xmlns:mc="http://schemas.openxmlformats.org/markup-compatibility/2006" type="blank" preserve="1">
   <p:cSld name="SECTION_TITLE_AND_DESCRIPTION">
     <p:spTree>
@@ -1899,7 +2226,7 @@
 </p:sldLayout>
 </file>
 
-<file path=ppt/slideLayouts/slideLayout35.xml><?xml version="1.0" encoding="utf-8"?>
+<file path=ppt/slideLayouts/slideLayout38.xml><?xml version="1.0" encoding="utf-8"?>
 <p:sldLayout xmlns:a="http://schemas.openxmlformats.org/drawingml/2006/main" xmlns:p="http://schemas.openxmlformats.org/presentationml/2006/main" xmlns:r="http://schemas.openxmlformats.org/officeDocument/2006/relationships" xmlns:p14="http://schemas.microsoft.com/office/powerpoint/2010/main" xmlns:p15="http://schemas.microsoft.com/office/powerpoint/2012/main" xmlns:mc="http://schemas.openxmlformats.org/markup-compatibility/2006" type="blank" preserve="1">
   <p:cSld name="CAPTION_ONLY">
     <p:spTree>
@@ -1921,31 +2248,9 @@
 </p:sldLayout>
 </file>
 
-<file path=ppt/slideLayouts/slideLayout36.xml><?xml version="1.0" encoding="utf-8"?>
+<file path=ppt/slideLayouts/slideLayout39.xml><?xml version="1.0" encoding="utf-8"?>
 <p:sldLayout xmlns:a="http://schemas.openxmlformats.org/drawingml/2006/main" xmlns:p="http://schemas.openxmlformats.org/presentationml/2006/main" xmlns:r="http://schemas.openxmlformats.org/officeDocument/2006/relationships" xmlns:p14="http://schemas.microsoft.com/office/powerpoint/2010/main" xmlns:p15="http://schemas.microsoft.com/office/powerpoint/2012/main" xmlns:mc="http://schemas.openxmlformats.org/markup-compatibility/2006" type="blank" preserve="1">
   <p:cSld name="simple-light-2">
-    <p:spTree>
-      <p:nvGrpSpPr>
-        <p:cNvPr id="1" name=""/>
-        <p:cNvGrpSpPr/>
-        <p:nvPr/>
-      </p:nvGrpSpPr>
-      <p:grpSpPr>
-        <a:xfrm>
-          <a:off x="0" y="0"/>
-          <a:ext cx="0" cy="0"/>
-          <a:chOff x="0" y="0"/>
-          <a:chExt cx="0" cy="0"/>
-        </a:xfrm>
-      </p:grpSpPr>
-    </p:spTree>
-  </p:cSld>
-</p:sldLayout>
-</file>
-
-<file path=ppt/slideLayouts/slideLayout37.xml><?xml version="1.0" encoding="utf-8"?>
-<p:sldLayout xmlns:a="http://schemas.openxmlformats.org/drawingml/2006/main" xmlns:p="http://schemas.openxmlformats.org/presentationml/2006/main" xmlns:r="http://schemas.openxmlformats.org/officeDocument/2006/relationships" xmlns:p14="http://schemas.microsoft.com/office/powerpoint/2010/main" xmlns:p15="http://schemas.microsoft.com/office/powerpoint/2012/main" xmlns:mc="http://schemas.openxmlformats.org/markup-compatibility/2006" type="blank" preserve="1">
-  <p:cSld name="Default 2">
     <p:spTree>
       <p:nvGrpSpPr>
         <p:cNvPr id="1" name=""/>
@@ -1968,6 +2273,28 @@
 <file path=ppt/slideLayouts/slideLayout4.xml><?xml version="1.0" encoding="utf-8"?>
 <p:sldLayout xmlns:a="http://schemas.openxmlformats.org/drawingml/2006/main" xmlns:p="http://schemas.openxmlformats.org/presentationml/2006/main" xmlns:r="http://schemas.openxmlformats.org/officeDocument/2006/relationships" xmlns:p14="http://schemas.microsoft.com/office/powerpoint/2010/main" xmlns:p15="http://schemas.microsoft.com/office/powerpoint/2012/main" xmlns:mc="http://schemas.openxmlformats.org/markup-compatibility/2006" type="blank" preserve="1">
   <p:cSld name="BLANK_1_1_1_1_1_1">
+    <p:spTree>
+      <p:nvGrpSpPr>
+        <p:cNvPr id="1" name=""/>
+        <p:cNvGrpSpPr/>
+        <p:nvPr/>
+      </p:nvGrpSpPr>
+      <p:grpSpPr>
+        <a:xfrm>
+          <a:off x="0" y="0"/>
+          <a:ext cx="0" cy="0"/>
+          <a:chOff x="0" y="0"/>
+          <a:chExt cx="0" cy="0"/>
+        </a:xfrm>
+      </p:grpSpPr>
+    </p:spTree>
+  </p:cSld>
+</p:sldLayout>
+</file>
+
+<file path=ppt/slideLayouts/slideLayout40.xml><?xml version="1.0" encoding="utf-8"?>
+<p:sldLayout xmlns:a="http://schemas.openxmlformats.org/drawingml/2006/main" xmlns:p="http://schemas.openxmlformats.org/presentationml/2006/main" xmlns:r="http://schemas.openxmlformats.org/officeDocument/2006/relationships" xmlns:p14="http://schemas.microsoft.com/office/powerpoint/2010/main" xmlns:p15="http://schemas.microsoft.com/office/powerpoint/2012/main" xmlns:mc="http://schemas.openxmlformats.org/markup-compatibility/2006" type="blank" preserve="1">
+  <p:cSld name="Default 2">
     <p:spTree>
       <p:nvGrpSpPr>
         <p:cNvPr id="1" name=""/>
@@ -3339,6 +3666,9 @@
   <p:sldLayoutIdLst>
     <p:sldLayoutId id="2147483669" r:id="rId2"/>
     <p:sldLayoutId id="2147483670" r:id="rId3"/>
+    <p:sldLayoutId id="2147483671" r:id="rId4"/>
+    <p:sldLayoutId id="2147483672" r:id="rId5"/>
+    <p:sldLayoutId id="2147483673" r:id="rId6"/>
   </p:sldLayoutIdLst>
 </p:sldMaster>
 </file>
@@ -3369,7 +3699,7 @@
       </p:grpSpPr>
       <p:sp>
         <p:nvSpPr>
-          <p:cNvPr id="65" name="PlaceHolder 1"/>
+          <p:cNvPr id="71" name="PlaceHolder 1"/>
           <p:cNvSpPr>
             <a:spLocks noGrp="1"/>
           </p:cNvSpPr>
@@ -3422,7 +3752,7 @@
       </p:sp>
       <p:sp>
         <p:nvSpPr>
-          <p:cNvPr id="66" name="PlaceHolder 2"/>
+          <p:cNvPr id="72" name="PlaceHolder 2"/>
           <p:cNvSpPr>
             <a:spLocks noGrp="1"/>
           </p:cNvSpPr>
@@ -3677,7 +4007,7 @@
   </p:cSld>
   <p:clrMap bg1="lt1" tx1="dk1" bg2="lt2" tx2="dk2" accent1="accent1" accent2="accent2" accent3="accent3" accent4="accent4" accent5="accent5" accent6="accent6" hlink="hlink" folHlink="folHlink"/>
   <p:sldLayoutIdLst>
-    <p:sldLayoutId id="2147483672" r:id="rId2"/>
+    <p:sldLayoutId id="2147483675" r:id="rId2"/>
   </p:sldLayoutIdLst>
 </p:sldMaster>
 </file>
@@ -3708,7 +4038,7 @@
       </p:grpSpPr>
       <p:grpSp>
         <p:nvGrpSpPr>
-          <p:cNvPr id="67" name="Google Shape;157;p21"/>
+          <p:cNvPr id="73" name="Google Shape;157;p21"/>
           <p:cNvGrpSpPr/>
           <p:nvPr/>
         </p:nvGrpSpPr>
@@ -3722,7 +4052,7 @@
         </p:grpSpPr>
         <p:cxnSp>
           <p:nvCxnSpPr>
-            <p:cNvPr id="68" name="Google Shape;158;p21"/>
+            <p:cNvPr id="74" name="Google Shape;158;p21"/>
             <p:cNvCxnSpPr/>
             <p:nvPr/>
           </p:nvCxnSpPr>
@@ -3744,7 +4074,7 @@
         </p:cxnSp>
         <p:grpSp>
           <p:nvGrpSpPr>
-            <p:cNvPr id="69" name="Google Shape;159;p21"/>
+            <p:cNvPr id="75" name="Google Shape;159;p21"/>
             <p:cNvGrpSpPr/>
             <p:nvPr/>
           </p:nvGrpSpPr>
@@ -3758,7 +4088,7 @@
           </p:grpSpPr>
           <p:cxnSp>
             <p:nvCxnSpPr>
-              <p:cNvPr id="70" name="Google Shape;160;p21"/>
+              <p:cNvPr id="76" name="Google Shape;160;p21"/>
               <p:cNvCxnSpPr/>
               <p:nvPr/>
             </p:nvCxnSpPr>
@@ -3780,7 +4110,7 @@
           </p:cxnSp>
           <p:cxnSp>
             <p:nvCxnSpPr>
-              <p:cNvPr id="71" name="Google Shape;161;p21"/>
+              <p:cNvPr id="77" name="Google Shape;161;p21"/>
               <p:cNvCxnSpPr/>
               <p:nvPr/>
             </p:nvCxnSpPr>
@@ -3802,7 +4132,7 @@
           </p:cxnSp>
           <p:cxnSp>
             <p:nvCxnSpPr>
-              <p:cNvPr id="72" name="Google Shape;162;p21"/>
+              <p:cNvPr id="78" name="Google Shape;162;p21"/>
               <p:cNvCxnSpPr/>
               <p:nvPr/>
             </p:nvCxnSpPr>
@@ -3824,7 +4154,7 @@
           </p:cxnSp>
           <p:cxnSp>
             <p:nvCxnSpPr>
-              <p:cNvPr id="73" name="Google Shape;163;p21"/>
+              <p:cNvPr id="79" name="Google Shape;163;p21"/>
               <p:cNvCxnSpPr/>
               <p:nvPr/>
             </p:nvCxnSpPr>
@@ -3847,7 +4177,7 @@
         </p:grpSp>
         <p:cxnSp>
           <p:nvCxnSpPr>
-            <p:cNvPr id="74" name="Google Shape;164;p21"/>
+            <p:cNvPr id="80" name="Google Shape;164;p21"/>
             <p:cNvCxnSpPr/>
             <p:nvPr/>
           </p:nvCxnSpPr>
@@ -3869,7 +4199,7 @@
         </p:cxnSp>
         <p:cxnSp>
           <p:nvCxnSpPr>
-            <p:cNvPr id="75" name="Google Shape;165;p21"/>
+            <p:cNvPr id="81" name="Google Shape;165;p21"/>
             <p:cNvCxnSpPr/>
             <p:nvPr/>
           </p:nvCxnSpPr>
@@ -3894,7 +4224,7 @@
   </p:cSld>
   <p:clrMap bg1="lt1" tx1="dk1" bg2="lt2" tx2="dk2" accent1="accent1" accent2="accent2" accent3="accent3" accent4="accent4" accent5="accent5" accent6="accent6" hlink="hlink" folHlink="folHlink"/>
   <p:sldLayoutIdLst>
-    <p:sldLayoutId id="2147483674" r:id="rId2"/>
+    <p:sldLayoutId id="2147483677" r:id="rId2"/>
   </p:sldLayoutIdLst>
 </p:sldMaster>
 </file>
@@ -3925,7 +4255,7 @@
       </p:grpSpPr>
       <p:grpSp>
         <p:nvGrpSpPr>
-          <p:cNvPr id="76" name="Google Shape;169;p22"/>
+          <p:cNvPr id="82" name="Google Shape;169;p22"/>
           <p:cNvGrpSpPr/>
           <p:nvPr/>
         </p:nvGrpSpPr>
@@ -3939,7 +4269,7 @@
         </p:grpSpPr>
         <p:cxnSp>
           <p:nvCxnSpPr>
-            <p:cNvPr id="77" name="Google Shape;170;p22"/>
+            <p:cNvPr id="83" name="Google Shape;170;p22"/>
             <p:cNvCxnSpPr/>
             <p:nvPr/>
           </p:nvCxnSpPr>
@@ -3961,7 +4291,7 @@
         </p:cxnSp>
         <p:cxnSp>
           <p:nvCxnSpPr>
-            <p:cNvPr id="78" name="Google Shape;171;p22"/>
+            <p:cNvPr id="84" name="Google Shape;171;p22"/>
             <p:cNvCxnSpPr/>
             <p:nvPr/>
           </p:nvCxnSpPr>
@@ -3983,7 +4313,7 @@
         </p:cxnSp>
         <p:cxnSp>
           <p:nvCxnSpPr>
-            <p:cNvPr id="79" name="Google Shape;172;p22"/>
+            <p:cNvPr id="85" name="Google Shape;172;p22"/>
             <p:cNvCxnSpPr/>
             <p:nvPr/>
           </p:nvCxnSpPr>
@@ -4005,7 +4335,7 @@
         </p:cxnSp>
         <p:cxnSp>
           <p:nvCxnSpPr>
-            <p:cNvPr id="80" name="Google Shape;173;p22"/>
+            <p:cNvPr id="86" name="Google Shape;173;p22"/>
             <p:cNvCxnSpPr/>
             <p:nvPr/>
           </p:nvCxnSpPr>
@@ -4030,7 +4360,7 @@
   </p:cSld>
   <p:clrMap bg1="lt1" tx1="dk1" bg2="lt2" tx2="dk2" accent1="accent1" accent2="accent2" accent3="accent3" accent4="accent4" accent5="accent5" accent6="accent6" hlink="hlink" folHlink="folHlink"/>
   <p:sldLayoutIdLst>
-    <p:sldLayoutId id="2147483676" r:id="rId2"/>
+    <p:sldLayoutId id="2147483679" r:id="rId2"/>
   </p:sldLayoutIdLst>
 </p:sldMaster>
 </file>
@@ -4061,7 +4391,7 @@
       </p:grpSpPr>
       <p:cxnSp>
         <p:nvCxnSpPr>
-          <p:cNvPr id="81" name="Google Shape;180;p23"/>
+          <p:cNvPr id="87" name="Google Shape;180;p23"/>
           <p:cNvCxnSpPr/>
           <p:nvPr/>
         </p:nvCxnSpPr>
@@ -4083,7 +4413,7 @@
       </p:cxnSp>
       <p:grpSp>
         <p:nvGrpSpPr>
-          <p:cNvPr id="82" name="Google Shape;181;p23"/>
+          <p:cNvPr id="88" name="Google Shape;181;p23"/>
           <p:cNvGrpSpPr/>
           <p:nvPr/>
         </p:nvGrpSpPr>
@@ -4097,7 +4427,7 @@
         </p:grpSpPr>
         <p:cxnSp>
           <p:nvCxnSpPr>
-            <p:cNvPr id="83" name="Google Shape;182;p23"/>
+            <p:cNvPr id="89" name="Google Shape;182;p23"/>
             <p:cNvCxnSpPr/>
             <p:nvPr/>
           </p:nvCxnSpPr>
@@ -4119,7 +4449,7 @@
         </p:cxnSp>
         <p:cxnSp>
           <p:nvCxnSpPr>
-            <p:cNvPr id="84" name="Google Shape;183;p23"/>
+            <p:cNvPr id="90" name="Google Shape;183;p23"/>
             <p:cNvCxnSpPr/>
             <p:nvPr/>
           </p:nvCxnSpPr>
@@ -4141,7 +4471,7 @@
         </p:cxnSp>
         <p:cxnSp>
           <p:nvCxnSpPr>
-            <p:cNvPr id="85" name="Google Shape;184;p23"/>
+            <p:cNvPr id="91" name="Google Shape;184;p23"/>
             <p:cNvCxnSpPr/>
             <p:nvPr/>
           </p:nvCxnSpPr>
@@ -4163,7 +4493,7 @@
         </p:cxnSp>
         <p:cxnSp>
           <p:nvCxnSpPr>
-            <p:cNvPr id="86" name="Google Shape;185;p23"/>
+            <p:cNvPr id="92" name="Google Shape;185;p23"/>
             <p:cNvCxnSpPr/>
             <p:nvPr/>
           </p:nvCxnSpPr>
@@ -4186,7 +4516,7 @@
       </p:grpSp>
       <p:cxnSp>
         <p:nvCxnSpPr>
-          <p:cNvPr id="87" name="Google Shape;186;p23"/>
+          <p:cNvPr id="93" name="Google Shape;186;p23"/>
           <p:cNvCxnSpPr/>
           <p:nvPr/>
         </p:nvCxnSpPr>
@@ -4208,7 +4538,7 @@
       </p:cxnSp>
       <p:cxnSp>
         <p:nvCxnSpPr>
-          <p:cNvPr id="88" name="Google Shape;187;p23"/>
+          <p:cNvPr id="94" name="Google Shape;187;p23"/>
           <p:cNvCxnSpPr/>
           <p:nvPr/>
         </p:nvCxnSpPr>
@@ -4232,7 +4562,7 @@
   </p:cSld>
   <p:clrMap bg1="lt1" tx1="dk1" bg2="lt2" tx2="dk2" accent1="accent1" accent2="accent2" accent3="accent3" accent4="accent4" accent5="accent5" accent6="accent6" hlink="hlink" folHlink="folHlink"/>
   <p:sldLayoutIdLst>
-    <p:sldLayoutId id="2147483678" r:id="rId2"/>
+    <p:sldLayoutId id="2147483681" r:id="rId2"/>
   </p:sldLayoutIdLst>
 </p:sldMaster>
 </file>
@@ -4263,7 +4593,7 @@
       </p:grpSpPr>
       <p:sp>
         <p:nvSpPr>
-          <p:cNvPr id="89" name="Google Shape;192;p24"/>
+          <p:cNvPr id="95" name="Google Shape;192;p24"/>
           <p:cNvSpPr/>
           <p:nvPr/>
         </p:nvSpPr>
@@ -4315,7 +4645,7 @@
       </p:sp>
       <p:cxnSp>
         <p:nvCxnSpPr>
-          <p:cNvPr id="90" name="Google Shape;193;p24"/>
+          <p:cNvPr id="96" name="Google Shape;193;p24"/>
           <p:cNvCxnSpPr/>
           <p:nvPr/>
         </p:nvCxnSpPr>
@@ -4337,7 +4667,7 @@
       </p:cxnSp>
       <p:cxnSp>
         <p:nvCxnSpPr>
-          <p:cNvPr id="91" name="Google Shape;194;p24"/>
+          <p:cNvPr id="97" name="Google Shape;194;p24"/>
           <p:cNvCxnSpPr/>
           <p:nvPr/>
         </p:nvCxnSpPr>
@@ -4361,7 +4691,7 @@
   </p:cSld>
   <p:clrMap bg1="lt1" tx1="dk1" bg2="lt2" tx2="dk2" accent1="accent1" accent2="accent2" accent3="accent3" accent4="accent4" accent5="accent5" accent6="accent6" hlink="hlink" folHlink="folHlink"/>
   <p:sldLayoutIdLst>
-    <p:sldLayoutId id="2147483680" r:id="rId2"/>
+    <p:sldLayoutId id="2147483683" r:id="rId2"/>
   </p:sldLayoutIdLst>
 </p:sldMaster>
 </file>
@@ -4392,7 +4722,7 @@
       </p:grpSpPr>
       <p:cxnSp>
         <p:nvCxnSpPr>
-          <p:cNvPr id="92" name="Google Shape;203;p25"/>
+          <p:cNvPr id="98" name="Google Shape;203;p25"/>
           <p:cNvCxnSpPr/>
           <p:nvPr/>
         </p:nvCxnSpPr>
@@ -4414,7 +4744,7 @@
       </p:cxnSp>
       <p:grpSp>
         <p:nvGrpSpPr>
-          <p:cNvPr id="93" name="Google Shape;204;p25"/>
+          <p:cNvPr id="99" name="Google Shape;204;p25"/>
           <p:cNvGrpSpPr/>
           <p:nvPr/>
         </p:nvGrpSpPr>
@@ -4428,7 +4758,7 @@
         </p:grpSpPr>
         <p:cxnSp>
           <p:nvCxnSpPr>
-            <p:cNvPr id="94" name="Google Shape;205;p25"/>
+            <p:cNvPr id="100" name="Google Shape;205;p25"/>
             <p:cNvCxnSpPr/>
             <p:nvPr/>
           </p:nvCxnSpPr>
@@ -4450,7 +4780,7 @@
         </p:cxnSp>
         <p:cxnSp>
           <p:nvCxnSpPr>
-            <p:cNvPr id="95" name="Google Shape;206;p25"/>
+            <p:cNvPr id="101" name="Google Shape;206;p25"/>
             <p:cNvCxnSpPr/>
             <p:nvPr/>
           </p:nvCxnSpPr>
@@ -4472,7 +4802,7 @@
         </p:cxnSp>
         <p:cxnSp>
           <p:nvCxnSpPr>
-            <p:cNvPr id="96" name="Google Shape;207;p25"/>
+            <p:cNvPr id="102" name="Google Shape;207;p25"/>
             <p:cNvCxnSpPr/>
             <p:nvPr/>
           </p:nvCxnSpPr>
@@ -4494,7 +4824,7 @@
         </p:cxnSp>
         <p:cxnSp>
           <p:nvCxnSpPr>
-            <p:cNvPr id="97" name="Google Shape;208;p25"/>
+            <p:cNvPr id="103" name="Google Shape;208;p25"/>
             <p:cNvCxnSpPr/>
             <p:nvPr/>
           </p:nvCxnSpPr>
@@ -4517,7 +4847,7 @@
       </p:grpSp>
       <p:cxnSp>
         <p:nvCxnSpPr>
-          <p:cNvPr id="98" name="Google Shape;209;p25"/>
+          <p:cNvPr id="104" name="Google Shape;209;p25"/>
           <p:cNvCxnSpPr/>
           <p:nvPr/>
         </p:nvCxnSpPr>
@@ -4541,7 +4871,7 @@
   </p:cSld>
   <p:clrMap bg1="lt1" tx1="dk1" bg2="lt2" tx2="dk2" accent1="accent1" accent2="accent2" accent3="accent3" accent4="accent4" accent5="accent5" accent6="accent6" hlink="hlink" folHlink="folHlink"/>
   <p:sldLayoutIdLst>
-    <p:sldLayoutId id="2147483682" r:id="rId2"/>
+    <p:sldLayoutId id="2147483685" r:id="rId2"/>
   </p:sldLayoutIdLst>
 </p:sldMaster>
 </file>
@@ -4572,7 +4902,7 @@
       </p:grpSpPr>
       <p:cxnSp>
         <p:nvCxnSpPr>
-          <p:cNvPr id="99" name="Google Shape;220;p26"/>
+          <p:cNvPr id="105" name="Google Shape;220;p26"/>
           <p:cNvCxnSpPr/>
           <p:nvPr/>
         </p:nvCxnSpPr>
@@ -4594,7 +4924,7 @@
       </p:cxnSp>
       <p:grpSp>
         <p:nvGrpSpPr>
-          <p:cNvPr id="100" name="Google Shape;221;p26"/>
+          <p:cNvPr id="106" name="Google Shape;221;p26"/>
           <p:cNvGrpSpPr/>
           <p:nvPr/>
         </p:nvGrpSpPr>
@@ -4608,7 +4938,7 @@
         </p:grpSpPr>
         <p:cxnSp>
           <p:nvCxnSpPr>
-            <p:cNvPr id="101" name="Google Shape;222;p26"/>
+            <p:cNvPr id="107" name="Google Shape;222;p26"/>
             <p:cNvCxnSpPr/>
             <p:nvPr/>
           </p:nvCxnSpPr>
@@ -4630,7 +4960,7 @@
         </p:cxnSp>
         <p:cxnSp>
           <p:nvCxnSpPr>
-            <p:cNvPr id="102" name="Google Shape;223;p26"/>
+            <p:cNvPr id="108" name="Google Shape;223;p26"/>
             <p:cNvCxnSpPr/>
             <p:nvPr/>
           </p:nvCxnSpPr>
@@ -4652,7 +4982,7 @@
         </p:cxnSp>
         <p:cxnSp>
           <p:nvCxnSpPr>
-            <p:cNvPr id="103" name="Google Shape;224;p26"/>
+            <p:cNvPr id="109" name="Google Shape;224;p26"/>
             <p:cNvCxnSpPr/>
             <p:nvPr/>
           </p:nvCxnSpPr>
@@ -4674,7 +5004,7 @@
         </p:cxnSp>
         <p:cxnSp>
           <p:nvCxnSpPr>
-            <p:cNvPr id="104" name="Google Shape;225;p26"/>
+            <p:cNvPr id="110" name="Google Shape;225;p26"/>
             <p:cNvCxnSpPr/>
             <p:nvPr/>
           </p:nvCxnSpPr>
@@ -4697,7 +5027,7 @@
       </p:grpSp>
       <p:cxnSp>
         <p:nvCxnSpPr>
-          <p:cNvPr id="105" name="Google Shape;226;p26"/>
+          <p:cNvPr id="111" name="Google Shape;226;p26"/>
           <p:cNvCxnSpPr/>
           <p:nvPr/>
         </p:nvCxnSpPr>
@@ -4719,7 +5049,7 @@
       </p:cxnSp>
       <p:cxnSp>
         <p:nvCxnSpPr>
-          <p:cNvPr id="106" name="Google Shape;227;p26"/>
+          <p:cNvPr id="112" name="Google Shape;227;p26"/>
           <p:cNvCxnSpPr/>
           <p:nvPr/>
         </p:nvCxnSpPr>
@@ -4743,7 +5073,7 @@
   </p:cSld>
   <p:clrMap bg1="lt1" tx1="dk1" bg2="lt2" tx2="dk2" accent1="accent1" accent2="accent2" accent3="accent3" accent4="accent4" accent5="accent5" accent6="accent6" hlink="hlink" folHlink="folHlink"/>
   <p:sldLayoutIdLst>
-    <p:sldLayoutId id="2147483684" r:id="rId2"/>
+    <p:sldLayoutId id="2147483687" r:id="rId2"/>
   </p:sldLayoutIdLst>
 </p:sldMaster>
 </file>
@@ -4774,7 +5104,7 @@
       </p:grpSpPr>
       <p:sp>
         <p:nvSpPr>
-          <p:cNvPr id="107" name="Google Shape;242;p27"/>
+          <p:cNvPr id="113" name="Google Shape;242;p27"/>
           <p:cNvSpPr/>
           <p:nvPr/>
         </p:nvSpPr>
@@ -4826,7 +5156,7 @@
       </p:sp>
       <p:cxnSp>
         <p:nvCxnSpPr>
-          <p:cNvPr id="108" name="Google Shape;243;p27"/>
+          <p:cNvPr id="114" name="Google Shape;243;p27"/>
           <p:cNvCxnSpPr/>
           <p:nvPr/>
         </p:nvCxnSpPr>
@@ -4848,7 +5178,7 @@
       </p:cxnSp>
       <p:cxnSp>
         <p:nvCxnSpPr>
-          <p:cNvPr id="109" name="Google Shape;244;p27"/>
+          <p:cNvPr id="115" name="Google Shape;244;p27"/>
           <p:cNvCxnSpPr/>
           <p:nvPr/>
         </p:nvCxnSpPr>
@@ -4872,7 +5202,7 @@
   </p:cSld>
   <p:clrMap bg1="lt1" tx1="dk1" bg2="lt2" tx2="dk2" accent1="accent1" accent2="accent2" accent3="accent3" accent4="accent4" accent5="accent5" accent6="accent6" hlink="hlink" folHlink="folHlink"/>
   <p:sldLayoutIdLst>
-    <p:sldLayoutId id="2147483686" r:id="rId2"/>
+    <p:sldLayoutId id="2147483689" r:id="rId2"/>
   </p:sldLayoutIdLst>
 </p:sldMaster>
 </file>
@@ -4938,7 +5268,7 @@
   </p:cSld>
   <p:clrMap bg1="lt1" tx1="dk1" bg2="lt2" tx2="dk2" accent1="accent1" accent2="accent2" accent3="accent3" accent4="accent4" accent5="accent5" accent6="accent6" hlink="hlink" folHlink="folHlink"/>
   <p:sldLayoutIdLst>
-    <p:sldLayoutId id="2147483688" r:id="rId2"/>
+    <p:sldLayoutId id="2147483691" r:id="rId2"/>
   </p:sldLayoutIdLst>
 </p:sldMaster>
 </file>
@@ -4969,7 +5299,7 @@
       </p:grpSpPr>
       <p:sp>
         <p:nvSpPr>
-          <p:cNvPr id="110" name="Google Shape;266;p29"/>
+          <p:cNvPr id="116" name="Google Shape;266;p29"/>
           <p:cNvSpPr/>
           <p:nvPr/>
         </p:nvSpPr>
@@ -5021,7 +5351,7 @@
       </p:sp>
       <p:cxnSp>
         <p:nvCxnSpPr>
-          <p:cNvPr id="111" name="Google Shape;267;p29"/>
+          <p:cNvPr id="117" name="Google Shape;267;p29"/>
           <p:cNvCxnSpPr/>
           <p:nvPr/>
         </p:nvCxnSpPr>
@@ -5043,7 +5373,7 @@
       </p:cxnSp>
       <p:cxnSp>
         <p:nvCxnSpPr>
-          <p:cNvPr id="112" name="Google Shape;268;p29"/>
+          <p:cNvPr id="118" name="Google Shape;268;p29"/>
           <p:cNvCxnSpPr/>
           <p:nvPr/>
         </p:nvCxnSpPr>
@@ -5067,7 +5397,7 @@
   </p:cSld>
   <p:clrMap bg1="lt1" tx1="dk1" bg2="lt2" tx2="dk2" accent1="accent1" accent2="accent2" accent3="accent3" accent4="accent4" accent5="accent5" accent6="accent6" hlink="hlink" folHlink="folHlink"/>
   <p:sldLayoutIdLst>
-    <p:sldLayoutId id="2147483690" r:id="rId2"/>
+    <p:sldLayoutId id="2147483693" r:id="rId2"/>
   </p:sldLayoutIdLst>
 </p:sldMaster>
 </file>
@@ -5098,7 +5428,7 @@
       </p:grpSpPr>
       <p:cxnSp>
         <p:nvCxnSpPr>
-          <p:cNvPr id="113" name="Google Shape;283;p30"/>
+          <p:cNvPr id="119" name="Google Shape;283;p30"/>
           <p:cNvCxnSpPr/>
           <p:nvPr/>
         </p:nvCxnSpPr>
@@ -5120,7 +5450,7 @@
       </p:cxnSp>
       <p:grpSp>
         <p:nvGrpSpPr>
-          <p:cNvPr id="114" name="Google Shape;284;p30"/>
+          <p:cNvPr id="120" name="Google Shape;284;p30"/>
           <p:cNvGrpSpPr/>
           <p:nvPr/>
         </p:nvGrpSpPr>
@@ -5134,7 +5464,7 @@
         </p:grpSpPr>
         <p:cxnSp>
           <p:nvCxnSpPr>
-            <p:cNvPr id="115" name="Google Shape;285;p30"/>
+            <p:cNvPr id="121" name="Google Shape;285;p30"/>
             <p:cNvCxnSpPr/>
             <p:nvPr/>
           </p:nvCxnSpPr>
@@ -5156,7 +5486,7 @@
         </p:cxnSp>
         <p:cxnSp>
           <p:nvCxnSpPr>
-            <p:cNvPr id="116" name="Google Shape;286;p30"/>
+            <p:cNvPr id="122" name="Google Shape;286;p30"/>
             <p:cNvCxnSpPr/>
             <p:nvPr/>
           </p:nvCxnSpPr>
@@ -5178,7 +5508,7 @@
         </p:cxnSp>
         <p:cxnSp>
           <p:nvCxnSpPr>
-            <p:cNvPr id="117" name="Google Shape;287;p30"/>
+            <p:cNvPr id="123" name="Google Shape;287;p30"/>
             <p:cNvCxnSpPr/>
             <p:nvPr/>
           </p:nvCxnSpPr>
@@ -5200,7 +5530,7 @@
         </p:cxnSp>
         <p:cxnSp>
           <p:nvCxnSpPr>
-            <p:cNvPr id="118" name="Google Shape;288;p30"/>
+            <p:cNvPr id="124" name="Google Shape;288;p30"/>
             <p:cNvCxnSpPr/>
             <p:nvPr/>
           </p:nvCxnSpPr>
@@ -5223,7 +5553,7 @@
       </p:grpSp>
       <p:cxnSp>
         <p:nvCxnSpPr>
-          <p:cNvPr id="119" name="Google Shape;289;p30"/>
+          <p:cNvPr id="125" name="Google Shape;289;p30"/>
           <p:cNvCxnSpPr/>
           <p:nvPr/>
         </p:nvCxnSpPr>
@@ -5247,7 +5577,7 @@
   </p:cSld>
   <p:clrMap bg1="lt1" tx1="dk1" bg2="lt2" tx2="dk2" accent1="accent1" accent2="accent2" accent3="accent3" accent4="accent4" accent5="accent5" accent6="accent6" hlink="hlink" folHlink="folHlink"/>
   <p:sldLayoutIdLst>
-    <p:sldLayoutId id="2147483692" r:id="rId2"/>
+    <p:sldLayoutId id="2147483695" r:id="rId2"/>
   </p:sldLayoutIdLst>
 </p:sldMaster>
 </file>
@@ -5278,7 +5608,7 @@
       </p:grpSpPr>
       <p:grpSp>
         <p:nvGrpSpPr>
-          <p:cNvPr id="120" name="Google Shape;17;p4"/>
+          <p:cNvPr id="126" name="Google Shape;17;p4"/>
           <p:cNvGrpSpPr/>
           <p:nvPr/>
         </p:nvGrpSpPr>
@@ -5292,7 +5622,7 @@
         </p:grpSpPr>
         <p:cxnSp>
           <p:nvCxnSpPr>
-            <p:cNvPr id="121" name="Google Shape;18;p4"/>
+            <p:cNvPr id="127" name="Google Shape;18;p4"/>
             <p:cNvCxnSpPr/>
             <p:nvPr/>
           </p:nvCxnSpPr>
@@ -5314,7 +5644,7 @@
         </p:cxnSp>
         <p:grpSp>
           <p:nvGrpSpPr>
-            <p:cNvPr id="122" name="Google Shape;19;p4"/>
+            <p:cNvPr id="128" name="Google Shape;19;p4"/>
             <p:cNvGrpSpPr/>
             <p:nvPr/>
           </p:nvGrpSpPr>
@@ -5328,7 +5658,7 @@
           </p:grpSpPr>
           <p:cxnSp>
             <p:nvCxnSpPr>
-              <p:cNvPr id="123" name="Google Shape;20;p4"/>
+              <p:cNvPr id="129" name="Google Shape;20;p4"/>
               <p:cNvCxnSpPr/>
               <p:nvPr/>
             </p:nvCxnSpPr>
@@ -5350,7 +5680,7 @@
           </p:cxnSp>
           <p:cxnSp>
             <p:nvCxnSpPr>
-              <p:cNvPr id="124" name="Google Shape;21;p4"/>
+              <p:cNvPr id="130" name="Google Shape;21;p4"/>
               <p:cNvCxnSpPr/>
               <p:nvPr/>
             </p:nvCxnSpPr>
@@ -5372,7 +5702,7 @@
           </p:cxnSp>
           <p:cxnSp>
             <p:nvCxnSpPr>
-              <p:cNvPr id="125" name="Google Shape;22;p4"/>
+              <p:cNvPr id="131" name="Google Shape;22;p4"/>
               <p:cNvCxnSpPr/>
               <p:nvPr/>
             </p:nvCxnSpPr>
@@ -5394,7 +5724,7 @@
           </p:cxnSp>
           <p:cxnSp>
             <p:nvCxnSpPr>
-              <p:cNvPr id="126" name="Google Shape;23;p4"/>
+              <p:cNvPr id="132" name="Google Shape;23;p4"/>
               <p:cNvCxnSpPr/>
               <p:nvPr/>
             </p:nvCxnSpPr>
@@ -5417,7 +5747,7 @@
         </p:grpSp>
         <p:cxnSp>
           <p:nvCxnSpPr>
-            <p:cNvPr id="127" name="Google Shape;24;p4"/>
+            <p:cNvPr id="133" name="Google Shape;24;p4"/>
             <p:cNvCxnSpPr/>
             <p:nvPr/>
           </p:nvCxnSpPr>
@@ -5439,7 +5769,7 @@
         </p:cxnSp>
         <p:cxnSp>
           <p:nvCxnSpPr>
-            <p:cNvPr id="128" name="Google Shape;25;p4"/>
+            <p:cNvPr id="134" name="Google Shape;25;p4"/>
             <p:cNvCxnSpPr/>
             <p:nvPr/>
           </p:nvCxnSpPr>
@@ -5462,7 +5792,7 @@
       </p:grpSp>
       <p:sp>
         <p:nvSpPr>
-          <p:cNvPr id="129" name="PlaceHolder 1"/>
+          <p:cNvPr id="135" name="PlaceHolder 1"/>
           <p:cNvSpPr>
             <a:spLocks noGrp="1"/>
           </p:cNvSpPr>
@@ -5515,7 +5845,7 @@
       </p:sp>
       <p:sp>
         <p:nvSpPr>
-          <p:cNvPr id="130" name="PlaceHolder 2"/>
+          <p:cNvPr id="136" name="PlaceHolder 2"/>
           <p:cNvSpPr>
             <a:spLocks noGrp="1"/>
           </p:cNvSpPr>
@@ -5770,7 +6100,7 @@
   </p:cSld>
   <p:clrMap bg1="lt1" tx1="dk1" bg2="lt2" tx2="dk2" accent1="accent1" accent2="accent2" accent3="accent3" accent4="accent4" accent5="accent5" accent6="accent6" hlink="hlink" folHlink="folHlink"/>
   <p:sldLayoutIdLst>
-    <p:sldLayoutId id="2147483694" r:id="rId2"/>
+    <p:sldLayoutId id="2147483697" r:id="rId2"/>
   </p:sldLayoutIdLst>
 </p:sldMaster>
 </file>
@@ -5796,9 +6126,9 @@
   </p:cSld>
   <p:clrMap bg1="lt1" tx1="dk1" bg2="lt2" tx2="dk2" accent1="accent1" accent2="accent2" accent3="accent3" accent4="accent4" accent5="accent5" accent6="accent6" hlink="hlink" folHlink="folHlink"/>
   <p:sldLayoutIdLst>
-    <p:sldLayoutId id="2147483696" r:id="rId2"/>
-    <p:sldLayoutId id="2147483697" r:id="rId3"/>
-    <p:sldLayoutId id="2147483698" r:id="rId4"/>
+    <p:sldLayoutId id="2147483699" r:id="rId2"/>
+    <p:sldLayoutId id="2147483700" r:id="rId3"/>
+    <p:sldLayoutId id="2147483701" r:id="rId4"/>
   </p:sldLayoutIdLst>
 </p:sldMaster>
 </file>
@@ -5829,7 +6159,7 @@
       </p:grpSpPr>
       <p:cxnSp>
         <p:nvCxnSpPr>
-          <p:cNvPr id="139" name="Google Shape;295;p32"/>
+          <p:cNvPr id="145" name="Google Shape;295;p32"/>
           <p:cNvCxnSpPr/>
           <p:nvPr/>
         </p:nvCxnSpPr>
@@ -5851,7 +6181,7 @@
       </p:cxnSp>
       <p:grpSp>
         <p:nvGrpSpPr>
-          <p:cNvPr id="140" name="Google Shape;296;p32"/>
+          <p:cNvPr id="146" name="Google Shape;296;p32"/>
           <p:cNvGrpSpPr/>
           <p:nvPr/>
         </p:nvGrpSpPr>
@@ -5865,7 +6195,7 @@
         </p:grpSpPr>
         <p:cxnSp>
           <p:nvCxnSpPr>
-            <p:cNvPr id="141" name="Google Shape;297;p32"/>
+            <p:cNvPr id="147" name="Google Shape;297;p32"/>
             <p:cNvCxnSpPr/>
             <p:nvPr/>
           </p:nvCxnSpPr>
@@ -5887,7 +6217,7 @@
         </p:cxnSp>
         <p:cxnSp>
           <p:nvCxnSpPr>
-            <p:cNvPr id="142" name="Google Shape;298;p32"/>
+            <p:cNvPr id="148" name="Google Shape;298;p32"/>
             <p:cNvCxnSpPr/>
             <p:nvPr/>
           </p:nvCxnSpPr>
@@ -5909,7 +6239,7 @@
         </p:cxnSp>
         <p:cxnSp>
           <p:nvCxnSpPr>
-            <p:cNvPr id="143" name="Google Shape;299;p32"/>
+            <p:cNvPr id="149" name="Google Shape;299;p32"/>
             <p:cNvCxnSpPr/>
             <p:nvPr/>
           </p:nvCxnSpPr>
@@ -5931,7 +6261,7 @@
         </p:cxnSp>
         <p:cxnSp>
           <p:nvCxnSpPr>
-            <p:cNvPr id="144" name="Google Shape;300;p32"/>
+            <p:cNvPr id="150" name="Google Shape;300;p32"/>
             <p:cNvCxnSpPr/>
             <p:nvPr/>
           </p:nvCxnSpPr>
@@ -5954,7 +6284,7 @@
       </p:grpSp>
       <p:cxnSp>
         <p:nvCxnSpPr>
-          <p:cNvPr id="145" name="Google Shape;301;p32"/>
+          <p:cNvPr id="151" name="Google Shape;301;p32"/>
           <p:cNvCxnSpPr/>
           <p:nvPr/>
         </p:nvCxnSpPr>
@@ -5976,7 +6306,7 @@
       </p:cxnSp>
       <p:cxnSp>
         <p:nvCxnSpPr>
-          <p:cNvPr id="146" name="Google Shape;302;p32"/>
+          <p:cNvPr id="152" name="Google Shape;302;p32"/>
           <p:cNvCxnSpPr/>
           <p:nvPr/>
         </p:nvCxnSpPr>
@@ -6000,7 +6330,7 @@
   </p:cSld>
   <p:clrMap bg1="lt1" tx1="dk1" bg2="lt2" tx2="dk2" accent1="accent1" accent2="accent2" accent3="accent3" accent4="accent4" accent5="accent5" accent6="accent6" hlink="hlink" folHlink="folHlink"/>
   <p:sldLayoutIdLst>
-    <p:sldLayoutId id="2147483700" r:id="rId2"/>
+    <p:sldLayoutId id="2147483703" r:id="rId2"/>
   </p:sldLayoutIdLst>
 </p:sldMaster>
 </file>
@@ -6031,7 +6361,7 @@
       </p:grpSpPr>
       <p:cxnSp>
         <p:nvCxnSpPr>
-          <p:cNvPr id="147" name="Google Shape;304;p33"/>
+          <p:cNvPr id="153" name="Google Shape;304;p33"/>
           <p:cNvCxnSpPr/>
           <p:nvPr/>
         </p:nvCxnSpPr>
@@ -6053,7 +6383,7 @@
       </p:cxnSp>
       <p:cxnSp>
         <p:nvCxnSpPr>
-          <p:cNvPr id="148" name="Google Shape;305;p33"/>
+          <p:cNvPr id="154" name="Google Shape;305;p33"/>
           <p:cNvCxnSpPr/>
           <p:nvPr/>
         </p:nvCxnSpPr>
@@ -6075,7 +6405,7 @@
       </p:cxnSp>
       <p:cxnSp>
         <p:nvCxnSpPr>
-          <p:cNvPr id="149" name="Google Shape;306;p33"/>
+          <p:cNvPr id="155" name="Google Shape;306;p33"/>
           <p:cNvCxnSpPr/>
           <p:nvPr/>
         </p:nvCxnSpPr>
@@ -6097,7 +6427,7 @@
       </p:cxnSp>
       <p:cxnSp>
         <p:nvCxnSpPr>
-          <p:cNvPr id="150" name="Google Shape;307;p33"/>
+          <p:cNvPr id="156" name="Google Shape;307;p33"/>
           <p:cNvCxnSpPr/>
           <p:nvPr/>
         </p:nvCxnSpPr>
@@ -6119,7 +6449,7 @@
       </p:cxnSp>
       <p:grpSp>
         <p:nvGrpSpPr>
-          <p:cNvPr id="151" name="Google Shape;308;p33"/>
+          <p:cNvPr id="157" name="Google Shape;308;p33"/>
           <p:cNvGrpSpPr/>
           <p:nvPr/>
         </p:nvGrpSpPr>
@@ -6133,7 +6463,7 @@
         </p:grpSpPr>
         <p:cxnSp>
           <p:nvCxnSpPr>
-            <p:cNvPr id="152" name="Google Shape;309;p33"/>
+            <p:cNvPr id="158" name="Google Shape;309;p33"/>
             <p:cNvCxnSpPr/>
             <p:nvPr/>
           </p:nvCxnSpPr>
@@ -6155,7 +6485,7 @@
         </p:cxnSp>
         <p:cxnSp>
           <p:nvCxnSpPr>
-            <p:cNvPr id="153" name="Google Shape;310;p33"/>
+            <p:cNvPr id="159" name="Google Shape;310;p33"/>
             <p:cNvCxnSpPr/>
             <p:nvPr/>
           </p:nvCxnSpPr>
@@ -6177,7 +6507,7 @@
         </p:cxnSp>
         <p:cxnSp>
           <p:nvCxnSpPr>
-            <p:cNvPr id="154" name="Google Shape;311;p33"/>
+            <p:cNvPr id="160" name="Google Shape;311;p33"/>
             <p:cNvCxnSpPr/>
             <p:nvPr/>
           </p:nvCxnSpPr>
@@ -6199,7 +6529,7 @@
         </p:cxnSp>
         <p:cxnSp>
           <p:nvCxnSpPr>
-            <p:cNvPr id="155" name="Google Shape;312;p33"/>
+            <p:cNvPr id="161" name="Google Shape;312;p33"/>
             <p:cNvCxnSpPr/>
             <p:nvPr/>
           </p:nvCxnSpPr>
@@ -6222,7 +6552,7 @@
       </p:grpSp>
       <p:cxnSp>
         <p:nvCxnSpPr>
-          <p:cNvPr id="156" name="Google Shape;313;p33"/>
+          <p:cNvPr id="162" name="Google Shape;313;p33"/>
           <p:cNvCxnSpPr/>
           <p:nvPr/>
         </p:nvCxnSpPr>
@@ -6244,7 +6574,7 @@
       </p:cxnSp>
       <p:cxnSp>
         <p:nvCxnSpPr>
-          <p:cNvPr id="157" name="Google Shape;314;p33"/>
+          <p:cNvPr id="163" name="Google Shape;314;p33"/>
           <p:cNvCxnSpPr/>
           <p:nvPr/>
         </p:nvCxnSpPr>
@@ -6268,7 +6598,7 @@
   </p:cSld>
   <p:clrMap bg1="lt1" tx1="dk1" bg2="lt2" tx2="dk2" accent1="accent1" accent2="accent2" accent3="accent3" accent4="accent4" accent5="accent5" accent6="accent6" hlink="hlink" folHlink="folHlink"/>
   <p:sldLayoutIdLst>
-    <p:sldLayoutId id="2147483702" r:id="rId2"/>
+    <p:sldLayoutId id="2147483705" r:id="rId2"/>
   </p:sldLayoutIdLst>
 </p:sldMaster>
 </file>
@@ -6299,7 +6629,7 @@
       </p:grpSpPr>
       <p:sp>
         <p:nvSpPr>
-          <p:cNvPr id="158" name="PlaceHolder 1"/>
+          <p:cNvPr id="164" name="PlaceHolder 1"/>
           <p:cNvSpPr>
             <a:spLocks noGrp="1"/>
           </p:cNvSpPr>
@@ -6352,7 +6682,7 @@
       </p:sp>
       <p:sp>
         <p:nvSpPr>
-          <p:cNvPr id="159" name="PlaceHolder 2"/>
+          <p:cNvPr id="165" name="PlaceHolder 2"/>
           <p:cNvSpPr>
             <a:spLocks noGrp="1"/>
           </p:cNvSpPr>
@@ -6605,7 +6935,7 @@
       </p:sp>
       <p:sp>
         <p:nvSpPr>
-          <p:cNvPr id="160" name="PlaceHolder 3"/>
+          <p:cNvPr id="166" name="PlaceHolder 3"/>
           <p:cNvSpPr>
             <a:spLocks noGrp="1"/>
           </p:cNvSpPr>
@@ -6860,7 +7190,7 @@
   </p:cSld>
   <p:clrMap bg1="lt1" tx1="dk1" bg2="lt2" tx2="dk2" accent1="accent1" accent2="accent2" accent3="accent3" accent4="accent4" accent5="accent5" accent6="accent6" hlink="hlink" folHlink="folHlink"/>
   <p:sldLayoutIdLst>
-    <p:sldLayoutId id="2147483704" r:id="rId2"/>
+    <p:sldLayoutId id="2147483707" r:id="rId2"/>
   </p:sldLayoutIdLst>
 </p:sldMaster>
 </file>
@@ -6924,7 +7254,7 @@
       </p:grpSpPr>
       <p:sp>
         <p:nvSpPr>
-          <p:cNvPr id="164" name="Google Shape;34;p6"/>
+          <p:cNvPr id="170" name="Google Shape;34;p6"/>
           <p:cNvSpPr/>
           <p:nvPr/>
         </p:nvSpPr>
@@ -6976,7 +7306,7 @@
       </p:sp>
       <p:cxnSp>
         <p:nvCxnSpPr>
-          <p:cNvPr id="165" name="Google Shape;35;p6"/>
+          <p:cNvPr id="171" name="Google Shape;35;p6"/>
           <p:cNvCxnSpPr/>
           <p:nvPr/>
         </p:nvCxnSpPr>
@@ -6998,7 +7328,7 @@
       </p:cxnSp>
       <p:grpSp>
         <p:nvGrpSpPr>
-          <p:cNvPr id="166" name="Google Shape;36;p6"/>
+          <p:cNvPr id="172" name="Google Shape;36;p6"/>
           <p:cNvGrpSpPr/>
           <p:nvPr/>
         </p:nvGrpSpPr>
@@ -7012,7 +7342,7 @@
         </p:grpSpPr>
         <p:cxnSp>
           <p:nvCxnSpPr>
-            <p:cNvPr id="167" name="Google Shape;37;p6"/>
+            <p:cNvPr id="173" name="Google Shape;37;p6"/>
             <p:cNvCxnSpPr/>
             <p:nvPr/>
           </p:nvCxnSpPr>
@@ -7034,7 +7364,7 @@
         </p:cxnSp>
         <p:cxnSp>
           <p:nvCxnSpPr>
-            <p:cNvPr id="168" name="Google Shape;38;p6"/>
+            <p:cNvPr id="174" name="Google Shape;38;p6"/>
             <p:cNvCxnSpPr/>
             <p:nvPr/>
           </p:nvCxnSpPr>
@@ -7056,7 +7386,7 @@
         </p:cxnSp>
         <p:cxnSp>
           <p:nvCxnSpPr>
-            <p:cNvPr id="169" name="Google Shape;39;p6"/>
+            <p:cNvPr id="175" name="Google Shape;39;p6"/>
             <p:cNvCxnSpPr/>
             <p:nvPr/>
           </p:nvCxnSpPr>
@@ -7078,7 +7408,7 @@
         </p:cxnSp>
         <p:cxnSp>
           <p:nvCxnSpPr>
-            <p:cNvPr id="170" name="Google Shape;40;p6"/>
+            <p:cNvPr id="176" name="Google Shape;40;p6"/>
             <p:cNvCxnSpPr/>
             <p:nvPr/>
           </p:nvCxnSpPr>
@@ -7101,7 +7431,7 @@
       </p:grpSp>
       <p:cxnSp>
         <p:nvCxnSpPr>
-          <p:cNvPr id="171" name="Google Shape;41;p6"/>
+          <p:cNvPr id="177" name="Google Shape;41;p6"/>
           <p:cNvCxnSpPr/>
           <p:nvPr/>
         </p:nvCxnSpPr>
@@ -7123,7 +7453,7 @@
       </p:cxnSp>
       <p:sp>
         <p:nvSpPr>
-          <p:cNvPr id="172" name="PlaceHolder 1"/>
+          <p:cNvPr id="178" name="PlaceHolder 1"/>
           <p:cNvSpPr>
             <a:spLocks noGrp="1"/>
           </p:cNvSpPr>
@@ -7178,7 +7508,7 @@
   </p:cSld>
   <p:clrMap bg1="lt1" tx1="dk1" bg2="lt2" tx2="dk2" accent1="accent1" accent2="accent2" accent3="accent3" accent4="accent4" accent5="accent5" accent6="accent6" hlink="hlink" folHlink="folHlink"/>
   <p:sldLayoutIdLst>
-    <p:sldLayoutId id="2147483706" r:id="rId2"/>
+    <p:sldLayoutId id="2147483709" r:id="rId2"/>
   </p:sldLayoutIdLst>
 </p:sldMaster>
 </file>
@@ -7209,7 +7539,7 @@
       </p:grpSpPr>
       <p:cxnSp>
         <p:nvCxnSpPr>
-          <p:cNvPr id="174" name="Google Shape;46;p7"/>
+          <p:cNvPr id="180" name="Google Shape;46;p7"/>
           <p:cNvCxnSpPr/>
           <p:nvPr/>
         </p:nvCxnSpPr>
@@ -7231,7 +7561,7 @@
       </p:cxnSp>
       <p:grpSp>
         <p:nvGrpSpPr>
-          <p:cNvPr id="175" name="Google Shape;47;p7"/>
+          <p:cNvPr id="181" name="Google Shape;47;p7"/>
           <p:cNvGrpSpPr/>
           <p:nvPr/>
         </p:nvGrpSpPr>
@@ -7245,7 +7575,7 @@
         </p:grpSpPr>
         <p:cxnSp>
           <p:nvCxnSpPr>
-            <p:cNvPr id="176" name="Google Shape;48;p7"/>
+            <p:cNvPr id="182" name="Google Shape;48;p7"/>
             <p:cNvCxnSpPr/>
             <p:nvPr/>
           </p:nvCxnSpPr>
@@ -7267,7 +7597,7 @@
         </p:cxnSp>
         <p:cxnSp>
           <p:nvCxnSpPr>
-            <p:cNvPr id="177" name="Google Shape;49;p7"/>
+            <p:cNvPr id="183" name="Google Shape;49;p7"/>
             <p:cNvCxnSpPr/>
             <p:nvPr/>
           </p:nvCxnSpPr>
@@ -7289,7 +7619,7 @@
         </p:cxnSp>
         <p:cxnSp>
           <p:nvCxnSpPr>
-            <p:cNvPr id="178" name="Google Shape;50;p7"/>
+            <p:cNvPr id="184" name="Google Shape;50;p7"/>
             <p:cNvCxnSpPr/>
             <p:nvPr/>
           </p:nvCxnSpPr>
@@ -7311,7 +7641,7 @@
         </p:cxnSp>
         <p:cxnSp>
           <p:nvCxnSpPr>
-            <p:cNvPr id="179" name="Google Shape;51;p7"/>
+            <p:cNvPr id="185" name="Google Shape;51;p7"/>
             <p:cNvCxnSpPr/>
             <p:nvPr/>
           </p:nvCxnSpPr>
@@ -7334,7 +7664,7 @@
       </p:grpSp>
       <p:cxnSp>
         <p:nvCxnSpPr>
-          <p:cNvPr id="180" name="Google Shape;52;p7"/>
+          <p:cNvPr id="186" name="Google Shape;52;p7"/>
           <p:cNvCxnSpPr/>
           <p:nvPr/>
         </p:nvCxnSpPr>
@@ -7358,7 +7688,7 @@
   </p:cSld>
   <p:clrMap bg1="lt1" tx1="dk1" bg2="lt2" tx2="dk2" accent1="accent1" accent2="accent2" accent3="accent3" accent4="accent4" accent5="accent5" accent6="accent6" hlink="hlink" folHlink="folHlink"/>
   <p:sldLayoutIdLst>
-    <p:sldLayoutId id="2147483708" r:id="rId2"/>
+    <p:sldLayoutId id="2147483711" r:id="rId2"/>
   </p:sldLayoutIdLst>
 </p:sldMaster>
 </file>
@@ -7391,7 +7721,7 @@
   </p:cSld>
   <p:clrMap bg1="lt1" tx1="dk1" bg2="lt2" tx2="dk2" accent1="accent1" accent2="accent2" accent3="accent3" accent4="accent4" accent5="accent5" accent6="accent6" hlink="hlink" folHlink="folHlink"/>
   <p:sldLayoutIdLst>
-    <p:sldLayoutId id="2147483710" r:id="rId2"/>
+    <p:sldLayoutId id="2147483713" r:id="rId2"/>
   </p:sldLayoutIdLst>
 </p:sldMaster>
 </file>
@@ -7422,7 +7752,7 @@
       </p:grpSpPr>
       <p:sp>
         <p:nvSpPr>
-          <p:cNvPr id="181" name="PlaceHolder 1"/>
+          <p:cNvPr id="187" name="PlaceHolder 1"/>
           <p:cNvSpPr>
             <a:spLocks noGrp="1"/>
           </p:cNvSpPr>
@@ -7475,7 +7805,7 @@
       </p:sp>
       <p:sp>
         <p:nvSpPr>
-          <p:cNvPr id="182" name="PlaceHolder 2"/>
+          <p:cNvPr id="188" name="PlaceHolder 2"/>
           <p:cNvSpPr>
             <a:spLocks noGrp="1"/>
           </p:cNvSpPr>
@@ -7730,7 +8060,7 @@
   </p:cSld>
   <p:clrMap bg1="lt1" tx1="dk1" bg2="lt2" tx2="dk2" accent1="accent1" accent2="accent2" accent3="accent3" accent4="accent4" accent5="accent5" accent6="accent6" hlink="hlink" folHlink="folHlink"/>
   <p:sldLayoutIdLst>
-    <p:sldLayoutId id="2147483712" r:id="rId2"/>
+    <p:sldLayoutId id="2147483715" r:id="rId2"/>
   </p:sldLayoutIdLst>
 </p:sldMaster>
 </file>
@@ -7763,7 +8093,7 @@
   </p:cSld>
   <p:clrMap bg1="lt1" tx1="dk1" bg2="lt2" tx2="dk2" accent1="accent1" accent2="accent2" accent3="accent3" accent4="accent4" accent5="accent5" accent6="accent6" hlink="hlink" folHlink="folHlink"/>
   <p:sldLayoutIdLst>
-    <p:sldLayoutId id="2147483714" r:id="rId2"/>
+    <p:sldLayoutId id="2147483717" r:id="rId2"/>
   </p:sldLayoutIdLst>
 </p:sldMaster>
 </file>
@@ -7796,7 +8126,7 @@
   </p:cSld>
   <p:clrMap bg1="lt1" tx1="dk1" bg2="lt2" tx2="dk2" accent1="accent1" accent2="accent2" accent3="accent3" accent4="accent4" accent5="accent5" accent6="accent6" hlink="hlink" folHlink="folHlink"/>
   <p:sldLayoutIdLst>
-    <p:sldLayoutId id="2147483716" r:id="rId2"/>
+    <p:sldLayoutId id="2147483719" r:id="rId2"/>
   </p:sldLayoutIdLst>
 </p:sldMaster>
 </file>
@@ -7829,7 +8159,7 @@
   </p:cSld>
   <p:clrMap bg1="lt1" tx1="dk1" bg2="lt2" tx2="dk2" accent1="accent1" accent2="accent2" accent3="accent3" accent4="accent4" accent5="accent5" accent6="accent6" hlink="hlink" folHlink="folHlink"/>
   <p:sldLayoutIdLst>
-    <p:sldLayoutId id="2147483718" r:id="rId2"/>
+    <p:sldLayoutId id="2147483721" r:id="rId2"/>
   </p:sldLayoutIdLst>
 </p:sldMaster>
 </file>
@@ -9000,7 +9330,7 @@
       </p:grpSpPr>
       <p:sp>
         <p:nvSpPr>
-          <p:cNvPr id="183" name="PlaceHolder 1"/>
+          <p:cNvPr id="189" name="PlaceHolder 1"/>
           <p:cNvSpPr>
             <a:spLocks noGrp="1"/>
           </p:cNvSpPr>
@@ -9060,7 +9390,7 @@
       </p:sp>
       <p:sp>
         <p:nvSpPr>
-          <p:cNvPr id="184" name="PlaceHolder 2"/>
+          <p:cNvPr id="190" name="PlaceHolder 2"/>
           <p:cNvSpPr>
             <a:spLocks noGrp="1"/>
           </p:cNvSpPr>
@@ -9120,7 +9450,7 @@
       </p:sp>
       <p:grpSp>
         <p:nvGrpSpPr>
-          <p:cNvPr id="185" name="Google Shape;327;p37"/>
+          <p:cNvPr id="191" name="Google Shape;327;p37"/>
           <p:cNvGrpSpPr/>
           <p:nvPr/>
         </p:nvGrpSpPr>
@@ -9134,7 +9464,7 @@
         </p:grpSpPr>
         <p:cxnSp>
           <p:nvCxnSpPr>
-            <p:cNvPr id="186" name="Google Shape;328;p37"/>
+            <p:cNvPr id="192" name="Google Shape;328;p37"/>
             <p:cNvCxnSpPr/>
             <p:nvPr/>
           </p:nvCxnSpPr>
@@ -9156,7 +9486,7 @@
         </p:cxnSp>
         <p:cxnSp>
           <p:nvCxnSpPr>
-            <p:cNvPr id="187" name="Google Shape;329;p37"/>
+            <p:cNvPr id="193" name="Google Shape;329;p37"/>
             <p:cNvCxnSpPr/>
             <p:nvPr/>
           </p:nvCxnSpPr>
@@ -9178,7 +9508,7 @@
         </p:cxnSp>
         <p:cxnSp>
           <p:nvCxnSpPr>
-            <p:cNvPr id="188" name="Google Shape;330;p37"/>
+            <p:cNvPr id="194" name="Google Shape;330;p37"/>
             <p:cNvCxnSpPr/>
             <p:nvPr/>
           </p:nvCxnSpPr>
@@ -9200,7 +9530,7 @@
         </p:cxnSp>
         <p:cxnSp>
           <p:nvCxnSpPr>
-            <p:cNvPr id="189" name="Google Shape;331;p37"/>
+            <p:cNvPr id="195" name="Google Shape;331;p37"/>
             <p:cNvCxnSpPr/>
             <p:nvPr/>
           </p:nvCxnSpPr>
@@ -9223,7 +9553,7 @@
       </p:grpSp>
       <p:cxnSp>
         <p:nvCxnSpPr>
-          <p:cNvPr id="190" name="Google Shape;332;p37"/>
+          <p:cNvPr id="196" name="Google Shape;332;p37"/>
           <p:cNvCxnSpPr/>
           <p:nvPr/>
         </p:nvCxnSpPr>
@@ -9245,7 +9575,7 @@
       </p:cxnSp>
       <p:cxnSp>
         <p:nvCxnSpPr>
-          <p:cNvPr id="191" name="Google Shape;333;p37"/>
+          <p:cNvPr id="197" name="Google Shape;333;p37"/>
           <p:cNvCxnSpPr/>
           <p:nvPr/>
         </p:nvCxnSpPr>
@@ -9267,7 +9597,7 @@
       </p:cxnSp>
       <p:cxnSp>
         <p:nvCxnSpPr>
-          <p:cNvPr id="192" name="Google Shape;334;p37"/>
+          <p:cNvPr id="198" name="Google Shape;334;p37"/>
           <p:cNvCxnSpPr/>
           <p:nvPr/>
         </p:nvCxnSpPr>
@@ -9289,7 +9619,7 @@
       </p:cxnSp>
       <p:cxnSp>
         <p:nvCxnSpPr>
-          <p:cNvPr id="193" name="Google Shape;335;p37"/>
+          <p:cNvPr id="199" name="Google Shape;335;p37"/>
           <p:cNvCxnSpPr/>
           <p:nvPr/>
         </p:nvCxnSpPr>
@@ -9341,7 +9671,7 @@
       </p:grpSpPr>
       <p:sp>
         <p:nvSpPr>
-          <p:cNvPr id="260" name="PlaceHolder 1"/>
+          <p:cNvPr id="263" name="PlaceHolder 1"/>
           <p:cNvSpPr>
             <a:spLocks noGrp="1"/>
           </p:cNvSpPr>
@@ -9351,7 +9681,7 @@
         </p:nvSpPr>
         <p:spPr>
           <a:xfrm>
-            <a:off x="2133720" y="1600200"/>
+            <a:off x="1905120" y="1037880"/>
             <a:ext cx="7238880" cy="1551600"/>
           </a:xfrm>
           <a:prstGeom prst="rect">
@@ -9399,51 +9729,9 @@
           </a:p>
         </p:txBody>
       </p:sp>
-      <p:sp>
-        <p:nvSpPr>
-          <p:cNvPr id="261" name="PlaceHolder 2"/>
-          <p:cNvSpPr>
-            <a:spLocks noGrp="1"/>
-          </p:cNvSpPr>
-          <p:nvPr>
-            <p:ph type="subTitle"/>
-          </p:nvPr>
-        </p:nvSpPr>
-        <p:spPr>
-          <a:xfrm>
-            <a:off x="2133720" y="3152880"/>
-            <a:ext cx="5571000" cy="1323000"/>
-          </a:xfrm>
-          <a:prstGeom prst="rect">
-            <a:avLst/>
-          </a:prstGeom>
-          <a:noFill/>
-          <a:ln w="0">
-            <a:noFill/>
-          </a:ln>
-        </p:spPr>
-        <p:txBody>
-          <a:bodyPr lIns="91440" rIns="91440" tIns="91440" bIns="91440" anchor="t">
-            <a:normAutofit/>
-          </a:bodyPr>
-          <a:p>
-            <a:pPr indent="0" algn="ctr">
-              <a:buNone/>
-            </a:pPr>
-            <a:endParaRPr b="0" lang="en-US" sz="1800" strike="noStrike" u="none">
-              <a:solidFill>
-                <a:srgbClr val="ffffff"/>
-              </a:solidFill>
-              <a:effectLst/>
-              <a:uFillTx/>
-              <a:latin typeface="Arial"/>
-            </a:endParaRPr>
-          </a:p>
-        </p:txBody>
-      </p:sp>
       <p:cxnSp>
         <p:nvCxnSpPr>
-          <p:cNvPr id="262" name="Google Shape;369;p 1"/>
+          <p:cNvPr id="264" name="Google Shape;369;p 1"/>
           <p:cNvCxnSpPr/>
           <p:nvPr/>
         </p:nvCxnSpPr>
@@ -9465,7 +9753,7 @@
       </p:cxnSp>
       <p:cxnSp>
         <p:nvCxnSpPr>
-          <p:cNvPr id="263" name="Google Shape;370;p 1"/>
+          <p:cNvPr id="265" name="Google Shape;370;p 1"/>
           <p:cNvCxnSpPr/>
           <p:nvPr/>
         </p:nvCxnSpPr>
@@ -9487,7 +9775,7 @@
       </p:cxnSp>
       <p:cxnSp>
         <p:nvCxnSpPr>
-          <p:cNvPr id="264" name="Google Shape;371;p 1"/>
+          <p:cNvPr id="266" name="Google Shape;371;p 1"/>
           <p:cNvCxnSpPr/>
           <p:nvPr/>
         </p:nvCxnSpPr>
@@ -9509,7 +9797,7 @@
       </p:cxnSp>
       <p:grpSp>
         <p:nvGrpSpPr>
-          <p:cNvPr id="265" name="Google Shape;372;p 1"/>
+          <p:cNvPr id="267" name="Google Shape;372;p 1"/>
           <p:cNvGrpSpPr/>
           <p:nvPr/>
         </p:nvGrpSpPr>
@@ -9523,7 +9811,7 @@
         </p:grpSpPr>
         <p:cxnSp>
           <p:nvCxnSpPr>
-            <p:cNvPr id="266" name="Google Shape;373;p 1"/>
+            <p:cNvPr id="268" name="Google Shape;373;p 1"/>
             <p:cNvCxnSpPr/>
             <p:nvPr/>
           </p:nvCxnSpPr>
@@ -9545,7 +9833,7 @@
         </p:cxnSp>
         <p:cxnSp>
           <p:nvCxnSpPr>
-            <p:cNvPr id="267" name="Google Shape;374;p 1"/>
+            <p:cNvPr id="269" name="Google Shape;374;p 1"/>
             <p:cNvCxnSpPr/>
             <p:nvPr/>
           </p:nvCxnSpPr>
@@ -9567,7 +9855,7 @@
         </p:cxnSp>
         <p:cxnSp>
           <p:nvCxnSpPr>
-            <p:cNvPr id="268" name="Google Shape;375;p 1"/>
+            <p:cNvPr id="270" name="Google Shape;375;p 1"/>
             <p:cNvCxnSpPr/>
             <p:nvPr/>
           </p:nvCxnSpPr>
@@ -9589,7 +9877,7 @@
         </p:cxnSp>
         <p:cxnSp>
           <p:nvCxnSpPr>
-            <p:cNvPr id="269" name="Google Shape;376;p 1"/>
+            <p:cNvPr id="271" name="Google Shape;376;p 1"/>
             <p:cNvCxnSpPr/>
             <p:nvPr/>
           </p:nvCxnSpPr>
@@ -9610,6 +9898,102 @@
           </p:spPr>
         </p:cxnSp>
       </p:grpSp>
+      <p:pic>
+        <p:nvPicPr>
+          <p:cNvPr id="272" name="" descr=""/>
+          <p:cNvPicPr/>
+          <p:nvPr/>
+        </p:nvPicPr>
+        <p:blipFill>
+          <a:blip r:embed="rId1"/>
+          <a:stretch/>
+        </p:blipFill>
+        <p:spPr>
+          <a:xfrm>
+            <a:off x="2057400" y="3286080"/>
+            <a:ext cx="3999240" cy="1514520"/>
+          </a:xfrm>
+          <a:prstGeom prst="rect">
+            <a:avLst/>
+          </a:prstGeom>
+          <a:noFill/>
+          <a:ln w="0">
+            <a:noFill/>
+          </a:ln>
+        </p:spPr>
+      </p:pic>
+      <p:pic>
+        <p:nvPicPr>
+          <p:cNvPr id="273" name="" descr=""/>
+          <p:cNvPicPr/>
+          <p:nvPr/>
+        </p:nvPicPr>
+        <p:blipFill>
+          <a:blip r:embed="rId2"/>
+          <a:stretch/>
+        </p:blipFill>
+        <p:spPr>
+          <a:xfrm>
+            <a:off x="6172200" y="3657600"/>
+            <a:ext cx="914400" cy="914400"/>
+          </a:xfrm>
+          <a:prstGeom prst="rect">
+            <a:avLst/>
+          </a:prstGeom>
+          <a:noFill/>
+          <a:ln w="0">
+            <a:noFill/>
+          </a:ln>
+        </p:spPr>
+      </p:pic>
+      <p:pic>
+        <p:nvPicPr>
+          <p:cNvPr id="274" name="" descr=""/>
+          <p:cNvPicPr/>
+          <p:nvPr/>
+        </p:nvPicPr>
+        <p:blipFill>
+          <a:blip r:embed="rId3"/>
+          <a:stretch/>
+        </p:blipFill>
+        <p:spPr>
+          <a:xfrm>
+            <a:off x="7495200" y="3609000"/>
+            <a:ext cx="963000" cy="963000"/>
+          </a:xfrm>
+          <a:prstGeom prst="rect">
+            <a:avLst/>
+          </a:prstGeom>
+          <a:noFill/>
+          <a:ln w="0">
+            <a:noFill/>
+          </a:ln>
+        </p:spPr>
+      </p:pic>
+      <p:pic>
+        <p:nvPicPr>
+          <p:cNvPr id="275" name="" descr=""/>
+          <p:cNvPicPr/>
+          <p:nvPr/>
+        </p:nvPicPr>
+        <p:blipFill>
+          <a:blip r:embed="rId4"/>
+          <a:stretch/>
+        </p:blipFill>
+        <p:spPr>
+          <a:xfrm>
+            <a:off x="457200" y="44640"/>
+            <a:ext cx="993240" cy="993240"/>
+          </a:xfrm>
+          <a:prstGeom prst="rect">
+            <a:avLst/>
+          </a:prstGeom>
+          <a:noFill/>
+          <a:ln w="0">
+            <a:noFill/>
+          </a:ln>
+        </p:spPr>
+      </p:pic>
     </p:spTree>
   </p:cSld>
   <mc:AlternateContent>
@@ -9642,7 +10026,7 @@
       </p:grpSpPr>
       <p:sp>
         <p:nvSpPr>
-          <p:cNvPr id="270" name="PlaceHolder 1"/>
+          <p:cNvPr id="276" name="PlaceHolder 1"/>
           <p:cNvSpPr>
             <a:spLocks noGrp="1"/>
           </p:cNvSpPr>
@@ -9715,51 +10099,9 @@
           </a:p>
         </p:txBody>
       </p:sp>
-      <p:sp>
-        <p:nvSpPr>
-          <p:cNvPr id="271" name="PlaceHolder 2"/>
-          <p:cNvSpPr>
-            <a:spLocks noGrp="1"/>
-          </p:cNvSpPr>
-          <p:nvPr>
-            <p:ph type="subTitle"/>
-          </p:nvPr>
-        </p:nvSpPr>
-        <p:spPr>
-          <a:xfrm>
-            <a:off x="2133720" y="3152880"/>
-            <a:ext cx="5571000" cy="1323000"/>
-          </a:xfrm>
-          <a:prstGeom prst="rect">
-            <a:avLst/>
-          </a:prstGeom>
-          <a:noFill/>
-          <a:ln w="0">
-            <a:noFill/>
-          </a:ln>
-        </p:spPr>
-        <p:txBody>
-          <a:bodyPr lIns="91440" rIns="91440" tIns="91440" bIns="91440" anchor="t">
-            <a:normAutofit/>
-          </a:bodyPr>
-          <a:p>
-            <a:pPr indent="0" algn="ctr">
-              <a:buNone/>
-            </a:pPr>
-            <a:endParaRPr b="0" lang="en-US" sz="1800" strike="noStrike" u="none">
-              <a:solidFill>
-                <a:srgbClr val="ffffff"/>
-              </a:solidFill>
-              <a:effectLst/>
-              <a:uFillTx/>
-              <a:latin typeface="Arial"/>
-            </a:endParaRPr>
-          </a:p>
-        </p:txBody>
-      </p:sp>
       <p:cxnSp>
         <p:nvCxnSpPr>
-          <p:cNvPr id="272" name="Google Shape;369;p 2"/>
+          <p:cNvPr id="277" name="Google Shape;369;p 2"/>
           <p:cNvCxnSpPr/>
           <p:nvPr/>
         </p:nvCxnSpPr>
@@ -9781,7 +10123,7 @@
       </p:cxnSp>
       <p:cxnSp>
         <p:nvCxnSpPr>
-          <p:cNvPr id="273" name="Google Shape;370;p 2"/>
+          <p:cNvPr id="278" name="Google Shape;370;p 2"/>
           <p:cNvCxnSpPr/>
           <p:nvPr/>
         </p:nvCxnSpPr>
@@ -9803,7 +10145,7 @@
       </p:cxnSp>
       <p:cxnSp>
         <p:nvCxnSpPr>
-          <p:cNvPr id="274" name="Google Shape;371;p 2"/>
+          <p:cNvPr id="279" name="Google Shape;371;p 2"/>
           <p:cNvCxnSpPr/>
           <p:nvPr/>
         </p:nvCxnSpPr>
@@ -9825,7 +10167,7 @@
       </p:cxnSp>
       <p:grpSp>
         <p:nvGrpSpPr>
-          <p:cNvPr id="275" name="Google Shape;372;p 2"/>
+          <p:cNvPr id="280" name="Google Shape;372;p 2"/>
           <p:cNvGrpSpPr/>
           <p:nvPr/>
         </p:nvGrpSpPr>
@@ -9839,7 +10181,7 @@
         </p:grpSpPr>
         <p:cxnSp>
           <p:nvCxnSpPr>
-            <p:cNvPr id="276" name="Google Shape;373;p 2"/>
+            <p:cNvPr id="281" name="Google Shape;373;p 2"/>
             <p:cNvCxnSpPr/>
             <p:nvPr/>
           </p:nvCxnSpPr>
@@ -9861,7 +10203,7 @@
         </p:cxnSp>
         <p:cxnSp>
           <p:nvCxnSpPr>
-            <p:cNvPr id="277" name="Google Shape;374;p 2"/>
+            <p:cNvPr id="282" name="Google Shape;374;p 2"/>
             <p:cNvCxnSpPr/>
             <p:nvPr/>
           </p:nvCxnSpPr>
@@ -9883,7 +10225,7 @@
         </p:cxnSp>
         <p:cxnSp>
           <p:nvCxnSpPr>
-            <p:cNvPr id="278" name="Google Shape;375;p 2"/>
+            <p:cNvPr id="283" name="Google Shape;375;p 2"/>
             <p:cNvCxnSpPr/>
             <p:nvPr/>
           </p:nvCxnSpPr>
@@ -9905,7 +10247,7 @@
         </p:cxnSp>
         <p:cxnSp>
           <p:nvCxnSpPr>
-            <p:cNvPr id="279" name="Google Shape;376;p 2"/>
+            <p:cNvPr id="284" name="Google Shape;376;p 2"/>
             <p:cNvCxnSpPr/>
             <p:nvPr/>
           </p:nvCxnSpPr>
@@ -9958,7 +10300,7 @@
       </p:grpSpPr>
       <p:sp>
         <p:nvSpPr>
-          <p:cNvPr id="280" name="PlaceHolder 1"/>
+          <p:cNvPr id="285" name="PlaceHolder 1"/>
           <p:cNvSpPr>
             <a:spLocks noGrp="1"/>
           </p:cNvSpPr>
@@ -10031,51 +10373,9 @@
           </a:p>
         </p:txBody>
       </p:sp>
-      <p:sp>
-        <p:nvSpPr>
-          <p:cNvPr id="281" name="PlaceHolder 2"/>
-          <p:cNvSpPr>
-            <a:spLocks noGrp="1"/>
-          </p:cNvSpPr>
-          <p:nvPr>
-            <p:ph type="subTitle"/>
-          </p:nvPr>
-        </p:nvSpPr>
-        <p:spPr>
-          <a:xfrm>
-            <a:off x="2133720" y="3152880"/>
-            <a:ext cx="5571000" cy="1323000"/>
-          </a:xfrm>
-          <a:prstGeom prst="rect">
-            <a:avLst/>
-          </a:prstGeom>
-          <a:noFill/>
-          <a:ln w="0">
-            <a:noFill/>
-          </a:ln>
-        </p:spPr>
-        <p:txBody>
-          <a:bodyPr lIns="91440" rIns="91440" tIns="91440" bIns="91440" anchor="t">
-            <a:normAutofit/>
-          </a:bodyPr>
-          <a:p>
-            <a:pPr indent="0" algn="ctr">
-              <a:buNone/>
-            </a:pPr>
-            <a:endParaRPr b="0" lang="en-US" sz="1800" strike="noStrike" u="none">
-              <a:solidFill>
-                <a:srgbClr val="ffffff"/>
-              </a:solidFill>
-              <a:effectLst/>
-              <a:uFillTx/>
-              <a:latin typeface="Arial"/>
-            </a:endParaRPr>
-          </a:p>
-        </p:txBody>
-      </p:sp>
       <p:cxnSp>
         <p:nvCxnSpPr>
-          <p:cNvPr id="282" name="Google Shape;369;p 3"/>
+          <p:cNvPr id="286" name="Google Shape;369;p 3"/>
           <p:cNvCxnSpPr/>
           <p:nvPr/>
         </p:nvCxnSpPr>
@@ -10097,7 +10397,7 @@
       </p:cxnSp>
       <p:cxnSp>
         <p:nvCxnSpPr>
-          <p:cNvPr id="283" name="Google Shape;370;p 3"/>
+          <p:cNvPr id="287" name="Google Shape;370;p 3"/>
           <p:cNvCxnSpPr/>
           <p:nvPr/>
         </p:nvCxnSpPr>
@@ -10119,7 +10419,7 @@
       </p:cxnSp>
       <p:cxnSp>
         <p:nvCxnSpPr>
-          <p:cNvPr id="284" name="Google Shape;371;p 3"/>
+          <p:cNvPr id="288" name="Google Shape;371;p 3"/>
           <p:cNvCxnSpPr/>
           <p:nvPr/>
         </p:nvCxnSpPr>
@@ -10141,7 +10441,7 @@
       </p:cxnSp>
       <p:grpSp>
         <p:nvGrpSpPr>
-          <p:cNvPr id="285" name="Google Shape;372;p 3"/>
+          <p:cNvPr id="289" name="Google Shape;372;p 3"/>
           <p:cNvGrpSpPr/>
           <p:nvPr/>
         </p:nvGrpSpPr>
@@ -10155,7 +10455,7 @@
         </p:grpSpPr>
         <p:cxnSp>
           <p:nvCxnSpPr>
-            <p:cNvPr id="286" name="Google Shape;373;p 3"/>
+            <p:cNvPr id="290" name="Google Shape;373;p 3"/>
             <p:cNvCxnSpPr/>
             <p:nvPr/>
           </p:nvCxnSpPr>
@@ -10177,7 +10477,7 @@
         </p:cxnSp>
         <p:cxnSp>
           <p:nvCxnSpPr>
-            <p:cNvPr id="287" name="Google Shape;374;p 3"/>
+            <p:cNvPr id="291" name="Google Shape;374;p 3"/>
             <p:cNvCxnSpPr/>
             <p:nvPr/>
           </p:nvCxnSpPr>
@@ -10199,7 +10499,7 @@
         </p:cxnSp>
         <p:cxnSp>
           <p:nvCxnSpPr>
-            <p:cNvPr id="288" name="Google Shape;375;p 3"/>
+            <p:cNvPr id="292" name="Google Shape;375;p 3"/>
             <p:cNvCxnSpPr/>
             <p:nvPr/>
           </p:nvCxnSpPr>
@@ -10221,7 +10521,7 @@
         </p:cxnSp>
         <p:cxnSp>
           <p:nvCxnSpPr>
-            <p:cNvPr id="289" name="Google Shape;376;p 3"/>
+            <p:cNvPr id="293" name="Google Shape;376;p 3"/>
             <p:cNvCxnSpPr/>
             <p:nvPr/>
           </p:nvCxnSpPr>
@@ -10274,7 +10574,7 @@
       </p:grpSpPr>
       <p:sp>
         <p:nvSpPr>
-          <p:cNvPr id="290" name="PlaceHolder 1"/>
+          <p:cNvPr id="294" name="PlaceHolder 1"/>
           <p:cNvSpPr>
             <a:spLocks noGrp="1"/>
           </p:cNvSpPr>
@@ -10332,51 +10632,9 @@
           </a:p>
         </p:txBody>
       </p:sp>
-      <p:sp>
-        <p:nvSpPr>
-          <p:cNvPr id="291" name="PlaceHolder 2"/>
-          <p:cNvSpPr>
-            <a:spLocks noGrp="1"/>
-          </p:cNvSpPr>
-          <p:nvPr>
-            <p:ph type="subTitle"/>
-          </p:nvPr>
-        </p:nvSpPr>
-        <p:spPr>
-          <a:xfrm>
-            <a:off x="4838760" y="2971800"/>
-            <a:ext cx="3523320" cy="1113480"/>
-          </a:xfrm>
-          <a:prstGeom prst="rect">
-            <a:avLst/>
-          </a:prstGeom>
-          <a:noFill/>
-          <a:ln w="0">
-            <a:noFill/>
-          </a:ln>
-        </p:spPr>
-        <p:txBody>
-          <a:bodyPr lIns="91440" rIns="91440" tIns="91440" bIns="91440" anchor="t">
-            <a:normAutofit/>
-          </a:bodyPr>
-          <a:p>
-            <a:pPr indent="0" algn="ctr">
-              <a:buNone/>
-            </a:pPr>
-            <a:endParaRPr b="0" lang="en-US" sz="1800" strike="noStrike" u="none">
-              <a:solidFill>
-                <a:srgbClr val="ffffff"/>
-              </a:solidFill>
-              <a:effectLst/>
-              <a:uFillTx/>
-              <a:latin typeface="Arial"/>
-            </a:endParaRPr>
-          </a:p>
-        </p:txBody>
-      </p:sp>
       <p:pic>
         <p:nvPicPr>
-          <p:cNvPr id="292" name="" descr=""/>
+          <p:cNvPr id="295" name="" descr=""/>
           <p:cNvPicPr/>
           <p:nvPr/>
         </p:nvPicPr>
@@ -10387,7 +10645,7 @@
         <p:spPr>
           <a:xfrm>
             <a:off x="914400" y="685800"/>
-            <a:ext cx="2679840" cy="3886200"/>
+            <a:ext cx="3098880" cy="3771720"/>
           </a:xfrm>
           <a:prstGeom prst="rect">
             <a:avLst/>
@@ -10430,7 +10688,7 @@
       </p:grpSpPr>
       <p:sp>
         <p:nvSpPr>
-          <p:cNvPr id="194" name="PlaceHolder 1"/>
+          <p:cNvPr id="200" name="PlaceHolder 1"/>
           <p:cNvSpPr>
             <a:spLocks noGrp="1"/>
           </p:cNvSpPr>
@@ -10490,7 +10748,7 @@
       </p:sp>
       <p:sp>
         <p:nvSpPr>
-          <p:cNvPr id="195" name="PlaceHolder 2"/>
+          <p:cNvPr id="201" name="PlaceHolder 2"/>
           <p:cNvSpPr>
             <a:spLocks noGrp="1"/>
           </p:cNvSpPr>
@@ -10550,7 +10808,7 @@
       </p:sp>
       <p:cxnSp>
         <p:nvCxnSpPr>
-          <p:cNvPr id="196" name="Google Shape;383;p41"/>
+          <p:cNvPr id="202" name="Google Shape;383;p41"/>
           <p:cNvCxnSpPr/>
           <p:nvPr/>
         </p:nvCxnSpPr>
@@ -10572,7 +10830,7 @@
       </p:cxnSp>
       <p:cxnSp>
         <p:nvCxnSpPr>
-          <p:cNvPr id="197" name="Google Shape;384;p41"/>
+          <p:cNvPr id="203" name="Google Shape;384;p41"/>
           <p:cNvCxnSpPr/>
           <p:nvPr/>
         </p:nvCxnSpPr>
@@ -10594,7 +10852,7 @@
       </p:cxnSp>
       <p:cxnSp>
         <p:nvCxnSpPr>
-          <p:cNvPr id="198" name="Google Shape;385;p41"/>
+          <p:cNvPr id="204" name="Google Shape;385;p41"/>
           <p:cNvCxnSpPr/>
           <p:nvPr/>
         </p:nvCxnSpPr>
@@ -10616,7 +10874,7 @@
       </p:cxnSp>
       <p:grpSp>
         <p:nvGrpSpPr>
-          <p:cNvPr id="199" name="Google Shape;386;p41"/>
+          <p:cNvPr id="205" name="Google Shape;386;p41"/>
           <p:cNvGrpSpPr/>
           <p:nvPr/>
         </p:nvGrpSpPr>
@@ -10630,7 +10888,7 @@
         </p:grpSpPr>
         <p:cxnSp>
           <p:nvCxnSpPr>
-            <p:cNvPr id="200" name="Google Shape;387;p41"/>
+            <p:cNvPr id="206" name="Google Shape;387;p41"/>
             <p:cNvCxnSpPr/>
             <p:nvPr/>
           </p:nvCxnSpPr>
@@ -10652,7 +10910,7 @@
         </p:cxnSp>
         <p:cxnSp>
           <p:nvCxnSpPr>
-            <p:cNvPr id="201" name="Google Shape;388;p41"/>
+            <p:cNvPr id="207" name="Google Shape;388;p41"/>
             <p:cNvCxnSpPr/>
             <p:nvPr/>
           </p:nvCxnSpPr>
@@ -10674,7 +10932,7 @@
         </p:cxnSp>
         <p:cxnSp>
           <p:nvCxnSpPr>
-            <p:cNvPr id="202" name="Google Shape;389;p41"/>
+            <p:cNvPr id="208" name="Google Shape;389;p41"/>
             <p:cNvCxnSpPr/>
             <p:nvPr/>
           </p:nvCxnSpPr>
@@ -10696,7 +10954,7 @@
         </p:cxnSp>
         <p:cxnSp>
           <p:nvCxnSpPr>
-            <p:cNvPr id="203" name="Google Shape;390;p41"/>
+            <p:cNvPr id="209" name="Google Shape;390;p41"/>
             <p:cNvCxnSpPr/>
             <p:nvPr/>
           </p:nvCxnSpPr>
@@ -10749,7 +11007,7 @@
       </p:grpSpPr>
       <p:sp>
         <p:nvSpPr>
-          <p:cNvPr id="204" name="PlaceHolder 1"/>
+          <p:cNvPr id="210" name="PlaceHolder 1"/>
           <p:cNvSpPr>
             <a:spLocks noGrp="1"/>
           </p:cNvSpPr>
@@ -10807,51 +11065,9 @@
           </a:p>
         </p:txBody>
       </p:sp>
-      <p:sp>
-        <p:nvSpPr>
-          <p:cNvPr id="205" name="PlaceHolder 2"/>
-          <p:cNvSpPr>
-            <a:spLocks noGrp="1"/>
-          </p:cNvSpPr>
-          <p:nvPr>
-            <p:ph type="subTitle"/>
-          </p:nvPr>
-        </p:nvSpPr>
-        <p:spPr>
-          <a:xfrm>
-            <a:off x="2133720" y="3152880"/>
-            <a:ext cx="5571000" cy="1323000"/>
-          </a:xfrm>
-          <a:prstGeom prst="rect">
-            <a:avLst/>
-          </a:prstGeom>
-          <a:noFill/>
-          <a:ln w="0">
-            <a:noFill/>
-          </a:ln>
-        </p:spPr>
-        <p:txBody>
-          <a:bodyPr lIns="91440" rIns="91440" tIns="91440" bIns="91440" anchor="t">
-            <a:normAutofit/>
-          </a:bodyPr>
-          <a:p>
-            <a:pPr indent="0" algn="ctr">
-              <a:buNone/>
-            </a:pPr>
-            <a:endParaRPr b="0" lang="en-US" sz="1800" strike="noStrike" u="none">
-              <a:solidFill>
-                <a:srgbClr val="ffffff"/>
-              </a:solidFill>
-              <a:effectLst/>
-              <a:uFillTx/>
-              <a:latin typeface="Arial"/>
-            </a:endParaRPr>
-          </a:p>
-        </p:txBody>
-      </p:sp>
       <p:cxnSp>
         <p:nvCxnSpPr>
-          <p:cNvPr id="206" name="Google Shape;369;p40"/>
+          <p:cNvPr id="211" name="Google Shape;369;p40"/>
           <p:cNvCxnSpPr/>
           <p:nvPr/>
         </p:nvCxnSpPr>
@@ -10873,7 +11089,7 @@
       </p:cxnSp>
       <p:cxnSp>
         <p:nvCxnSpPr>
-          <p:cNvPr id="207" name="Google Shape;370;p40"/>
+          <p:cNvPr id="212" name="Google Shape;370;p40"/>
           <p:cNvCxnSpPr/>
           <p:nvPr/>
         </p:nvCxnSpPr>
@@ -10895,7 +11111,7 @@
       </p:cxnSp>
       <p:cxnSp>
         <p:nvCxnSpPr>
-          <p:cNvPr id="208" name="Google Shape;371;p40"/>
+          <p:cNvPr id="213" name="Google Shape;371;p40"/>
           <p:cNvCxnSpPr/>
           <p:nvPr/>
         </p:nvCxnSpPr>
@@ -10917,7 +11133,7 @@
       </p:cxnSp>
       <p:grpSp>
         <p:nvGrpSpPr>
-          <p:cNvPr id="209" name="Google Shape;372;p40"/>
+          <p:cNvPr id="214" name="Google Shape;372;p40"/>
           <p:cNvGrpSpPr/>
           <p:nvPr/>
         </p:nvGrpSpPr>
@@ -10931,7 +11147,7 @@
         </p:grpSpPr>
         <p:cxnSp>
           <p:nvCxnSpPr>
-            <p:cNvPr id="210" name="Google Shape;373;p40"/>
+            <p:cNvPr id="215" name="Google Shape;373;p40"/>
             <p:cNvCxnSpPr/>
             <p:nvPr/>
           </p:nvCxnSpPr>
@@ -10953,7 +11169,7 @@
         </p:cxnSp>
         <p:cxnSp>
           <p:nvCxnSpPr>
-            <p:cNvPr id="211" name="Google Shape;374;p40"/>
+            <p:cNvPr id="216" name="Google Shape;374;p40"/>
             <p:cNvCxnSpPr/>
             <p:nvPr/>
           </p:nvCxnSpPr>
@@ -10975,7 +11191,7 @@
         </p:cxnSp>
         <p:cxnSp>
           <p:nvCxnSpPr>
-            <p:cNvPr id="212" name="Google Shape;375;p40"/>
+            <p:cNvPr id="217" name="Google Shape;375;p40"/>
             <p:cNvCxnSpPr/>
             <p:nvPr/>
           </p:nvCxnSpPr>
@@ -10997,7 +11213,7 @@
         </p:cxnSp>
         <p:cxnSp>
           <p:nvCxnSpPr>
-            <p:cNvPr id="213" name="Google Shape;376;p40"/>
+            <p:cNvPr id="218" name="Google Shape;376;p40"/>
             <p:cNvCxnSpPr/>
             <p:nvPr/>
           </p:nvCxnSpPr>
@@ -11050,7 +11266,7 @@
       </p:grpSpPr>
       <p:sp>
         <p:nvSpPr>
-          <p:cNvPr id="214" name="PlaceHolder 1"/>
+          <p:cNvPr id="219" name="PlaceHolder 1"/>
           <p:cNvSpPr>
             <a:spLocks noGrp="1"/>
           </p:cNvSpPr>
@@ -11108,51 +11324,9 @@
           </a:p>
         </p:txBody>
       </p:sp>
-      <p:sp>
-        <p:nvSpPr>
-          <p:cNvPr id="215" name="PlaceHolder 2"/>
-          <p:cNvSpPr>
-            <a:spLocks noGrp="1"/>
-          </p:cNvSpPr>
-          <p:nvPr>
-            <p:ph type="subTitle"/>
-          </p:nvPr>
-        </p:nvSpPr>
-        <p:spPr>
-          <a:xfrm>
-            <a:off x="2133720" y="3152880"/>
-            <a:ext cx="5571000" cy="1323000"/>
-          </a:xfrm>
-          <a:prstGeom prst="rect">
-            <a:avLst/>
-          </a:prstGeom>
-          <a:noFill/>
-          <a:ln w="0">
-            <a:noFill/>
-          </a:ln>
-        </p:spPr>
-        <p:txBody>
-          <a:bodyPr lIns="91440" rIns="91440" tIns="91440" bIns="91440" anchor="t">
-            <a:normAutofit/>
-          </a:bodyPr>
-          <a:p>
-            <a:pPr indent="0" algn="ctr">
-              <a:buNone/>
-            </a:pPr>
-            <a:endParaRPr b="0" lang="en-US" sz="1800" strike="noStrike" u="none">
-              <a:solidFill>
-                <a:srgbClr val="ffffff"/>
-              </a:solidFill>
-              <a:effectLst/>
-              <a:uFillTx/>
-              <a:latin typeface="Arial"/>
-            </a:endParaRPr>
-          </a:p>
-        </p:txBody>
-      </p:sp>
       <p:cxnSp>
         <p:nvCxnSpPr>
-          <p:cNvPr id="216" name="Google Shape;369;p40"/>
+          <p:cNvPr id="220" name="Google Shape;369;p40"/>
           <p:cNvCxnSpPr/>
           <p:nvPr/>
         </p:nvCxnSpPr>
@@ -11174,7 +11348,7 @@
       </p:cxnSp>
       <p:cxnSp>
         <p:nvCxnSpPr>
-          <p:cNvPr id="217" name="Google Shape;370;p40"/>
+          <p:cNvPr id="221" name="Google Shape;370;p40"/>
           <p:cNvCxnSpPr/>
           <p:nvPr/>
         </p:nvCxnSpPr>
@@ -11196,7 +11370,7 @@
       </p:cxnSp>
       <p:cxnSp>
         <p:nvCxnSpPr>
-          <p:cNvPr id="218" name="Google Shape;371;p40"/>
+          <p:cNvPr id="222" name="Google Shape;371;p40"/>
           <p:cNvCxnSpPr/>
           <p:nvPr/>
         </p:nvCxnSpPr>
@@ -11218,7 +11392,7 @@
       </p:cxnSp>
       <p:grpSp>
         <p:nvGrpSpPr>
-          <p:cNvPr id="219" name="Google Shape;372;p40"/>
+          <p:cNvPr id="223" name="Google Shape;372;p40"/>
           <p:cNvGrpSpPr/>
           <p:nvPr/>
         </p:nvGrpSpPr>
@@ -11232,7 +11406,7 @@
         </p:grpSpPr>
         <p:cxnSp>
           <p:nvCxnSpPr>
-            <p:cNvPr id="220" name="Google Shape;373;p40"/>
+            <p:cNvPr id="224" name="Google Shape;373;p40"/>
             <p:cNvCxnSpPr/>
             <p:nvPr/>
           </p:nvCxnSpPr>
@@ -11254,7 +11428,7 @@
         </p:cxnSp>
         <p:cxnSp>
           <p:nvCxnSpPr>
-            <p:cNvPr id="221" name="Google Shape;374;p40"/>
+            <p:cNvPr id="225" name="Google Shape;374;p40"/>
             <p:cNvCxnSpPr/>
             <p:nvPr/>
           </p:nvCxnSpPr>
@@ -11276,7 +11450,7 @@
         </p:cxnSp>
         <p:cxnSp>
           <p:nvCxnSpPr>
-            <p:cNvPr id="222" name="Google Shape;375;p40"/>
+            <p:cNvPr id="226" name="Google Shape;375;p40"/>
             <p:cNvCxnSpPr/>
             <p:nvPr/>
           </p:nvCxnSpPr>
@@ -11298,7 +11472,7 @@
         </p:cxnSp>
         <p:cxnSp>
           <p:nvCxnSpPr>
-            <p:cNvPr id="223" name="Google Shape;376;p40"/>
+            <p:cNvPr id="227" name="Google Shape;376;p40"/>
             <p:cNvCxnSpPr/>
             <p:nvPr/>
           </p:nvCxnSpPr>
@@ -11351,7 +11525,7 @@
       </p:grpSpPr>
       <p:sp>
         <p:nvSpPr>
-          <p:cNvPr id="224" name="PlaceHolder 1"/>
+          <p:cNvPr id="228" name="PlaceHolder 1"/>
           <p:cNvSpPr>
             <a:spLocks noGrp="1"/>
           </p:cNvSpPr>
@@ -11409,51 +11583,9 @@
           </a:p>
         </p:txBody>
       </p:sp>
-      <p:sp>
-        <p:nvSpPr>
-          <p:cNvPr id="225" name="PlaceHolder 2"/>
-          <p:cNvSpPr>
-            <a:spLocks noGrp="1"/>
-          </p:cNvSpPr>
-          <p:nvPr>
-            <p:ph type="subTitle"/>
-          </p:nvPr>
-        </p:nvSpPr>
-        <p:spPr>
-          <a:xfrm>
-            <a:off x="4838760" y="2971800"/>
-            <a:ext cx="3523320" cy="1113480"/>
-          </a:xfrm>
-          <a:prstGeom prst="rect">
-            <a:avLst/>
-          </a:prstGeom>
-          <a:noFill/>
-          <a:ln w="0">
-            <a:noFill/>
-          </a:ln>
-        </p:spPr>
-        <p:txBody>
-          <a:bodyPr lIns="91440" rIns="91440" tIns="91440" bIns="91440" anchor="t">
-            <a:normAutofit/>
-          </a:bodyPr>
-          <a:p>
-            <a:pPr indent="0" algn="ctr">
-              <a:buNone/>
-            </a:pPr>
-            <a:endParaRPr b="0" lang="en-US" sz="1800" strike="noStrike" u="none">
-              <a:solidFill>
-                <a:srgbClr val="ffffff"/>
-              </a:solidFill>
-              <a:effectLst/>
-              <a:uFillTx/>
-              <a:latin typeface="Arial"/>
-            </a:endParaRPr>
-          </a:p>
-        </p:txBody>
-      </p:sp>
       <p:pic>
         <p:nvPicPr>
-          <p:cNvPr id="226" name="Google Shape;524;p53" descr=""/>
+          <p:cNvPr id="229" name="Google Shape;524;p53" descr=""/>
           <p:cNvPicPr/>
           <p:nvPr/>
         </p:nvPicPr>
@@ -11511,7 +11643,7 @@
       </p:grpSpPr>
       <p:sp>
         <p:nvSpPr>
-          <p:cNvPr id="227" name="PlaceHolder 1"/>
+          <p:cNvPr id="230" name="PlaceHolder 1"/>
           <p:cNvSpPr>
             <a:spLocks noGrp="1"/>
           </p:cNvSpPr>
@@ -11571,7 +11703,7 @@
       </p:sp>
       <p:sp>
         <p:nvSpPr>
-          <p:cNvPr id="228" name="PlaceHolder 2"/>
+          <p:cNvPr id="231" name="PlaceHolder 2"/>
           <p:cNvSpPr>
             <a:spLocks noGrp="1"/>
           </p:cNvSpPr>
@@ -11631,7 +11763,7 @@
       </p:sp>
       <p:cxnSp>
         <p:nvCxnSpPr>
-          <p:cNvPr id="229" name="Google Shape;383;p41"/>
+          <p:cNvPr id="232" name="Google Shape;383;p41"/>
           <p:cNvCxnSpPr/>
           <p:nvPr/>
         </p:nvCxnSpPr>
@@ -11653,7 +11785,7 @@
       </p:cxnSp>
       <p:cxnSp>
         <p:nvCxnSpPr>
-          <p:cNvPr id="230" name="Google Shape;384;p41"/>
+          <p:cNvPr id="233" name="Google Shape;384;p41"/>
           <p:cNvCxnSpPr/>
           <p:nvPr/>
         </p:nvCxnSpPr>
@@ -11675,7 +11807,7 @@
       </p:cxnSp>
       <p:cxnSp>
         <p:nvCxnSpPr>
-          <p:cNvPr id="231" name="Google Shape;385;p41"/>
+          <p:cNvPr id="234" name="Google Shape;385;p41"/>
           <p:cNvCxnSpPr/>
           <p:nvPr/>
         </p:nvCxnSpPr>
@@ -11697,7 +11829,7 @@
       </p:cxnSp>
       <p:grpSp>
         <p:nvGrpSpPr>
-          <p:cNvPr id="232" name="Google Shape;386;p41"/>
+          <p:cNvPr id="235" name="Google Shape;386;p41"/>
           <p:cNvGrpSpPr/>
           <p:nvPr/>
         </p:nvGrpSpPr>
@@ -11711,7 +11843,7 @@
         </p:grpSpPr>
         <p:cxnSp>
           <p:nvCxnSpPr>
-            <p:cNvPr id="233" name="Google Shape;387;p41"/>
+            <p:cNvPr id="236" name="Google Shape;387;p41"/>
             <p:cNvCxnSpPr/>
             <p:nvPr/>
           </p:nvCxnSpPr>
@@ -11733,7 +11865,7 @@
         </p:cxnSp>
         <p:cxnSp>
           <p:nvCxnSpPr>
-            <p:cNvPr id="234" name="Google Shape;388;p41"/>
+            <p:cNvPr id="237" name="Google Shape;388;p41"/>
             <p:cNvCxnSpPr/>
             <p:nvPr/>
           </p:nvCxnSpPr>
@@ -11755,7 +11887,7 @@
         </p:cxnSp>
         <p:cxnSp>
           <p:nvCxnSpPr>
-            <p:cNvPr id="235" name="Google Shape;389;p41"/>
+            <p:cNvPr id="238" name="Google Shape;389;p41"/>
             <p:cNvCxnSpPr/>
             <p:nvPr/>
           </p:nvCxnSpPr>
@@ -11777,7 +11909,7 @@
         </p:cxnSp>
         <p:cxnSp>
           <p:nvCxnSpPr>
-            <p:cNvPr id="236" name="Google Shape;390;p41"/>
+            <p:cNvPr id="239" name="Google Shape;390;p41"/>
             <p:cNvCxnSpPr/>
             <p:nvPr/>
           </p:nvCxnSpPr>
@@ -11828,37 +11960,9 @@
           <a:chExt cx="0" cy="0"/>
         </a:xfrm>
       </p:grpSpPr>
-      <p:pic>
-        <p:nvPicPr>
-          <p:cNvPr id="237" name="Google Shape;501;p51" descr=""/>
-          <p:cNvPicPr/>
-          <p:nvPr/>
-        </p:nvPicPr>
-        <p:blipFill>
-          <a:blip r:embed="rId1"/>
-          <a:srcRect l="0" t="6264" r="0" b="6264"/>
-          <a:stretch/>
-        </p:blipFill>
-        <p:spPr>
-          <a:xfrm>
-            <a:off x="5066640" y="567360"/>
-            <a:ext cx="3518640" cy="4614840"/>
-          </a:xfrm>
-          <a:prstGeom prst="rect">
-            <a:avLst/>
-          </a:prstGeom>
-          <a:noFill/>
-          <a:ln w="9525">
-            <a:solidFill>
-              <a:srgbClr val="ffffff"/>
-            </a:solidFill>
-            <a:round/>
-          </a:ln>
-        </p:spPr>
-      </p:pic>
       <p:sp>
         <p:nvSpPr>
-          <p:cNvPr id="238" name="PlaceHolder 1"/>
+          <p:cNvPr id="240" name="PlaceHolder 1"/>
           <p:cNvSpPr>
             <a:spLocks noGrp="1"/>
           </p:cNvSpPr>
@@ -11918,7 +12022,7 @@
       </p:sp>
       <p:sp>
         <p:nvSpPr>
-          <p:cNvPr id="239" name="PlaceHolder 2"/>
+          <p:cNvPr id="241" name="PlaceHolder 2"/>
           <p:cNvSpPr>
             <a:spLocks noGrp="1"/>
           </p:cNvSpPr>
@@ -11944,20 +12048,80 @@
             <a:normAutofit/>
           </a:bodyPr>
           <a:p>
-            <a:pPr indent="0" algn="ctr">
+            <a:pPr indent="0">
               <a:buNone/>
             </a:pPr>
-            <a:endParaRPr b="0" lang="en-US" sz="1800" strike="noStrike" u="none">
+            <a:r>
+              <a:rPr b="0" lang="en-US" sz="1500" strike="noStrike" u="none">
+                <a:solidFill>
+                  <a:srgbClr val="ffffff"/>
+                </a:solidFill>
+                <a:effectLst/>
+                <a:uFillTx/>
+                <a:latin typeface="Arial Black"/>
+              </a:rPr>
+              <a:t>Запуск игры — за 1 секунду </a:t>
+            </a:r>
+            <a:endParaRPr b="0" lang="en-US" sz="1500" strike="noStrike" u="none">
               <a:solidFill>
                 <a:srgbClr val="ffffff"/>
               </a:solidFill>
               <a:effectLst/>
               <a:uFillTx/>
-              <a:latin typeface="Arial"/>
+              <a:latin typeface="Arial Black"/>
+              <a:ea typeface="Liberation Mono;Courier New;DejaVu Sans Mono"/>
             </a:endParaRPr>
           </a:p>
         </p:txBody>
       </p:sp>
+      <p:pic>
+        <p:nvPicPr>
+          <p:cNvPr id="242" name="" descr=""/>
+          <p:cNvPicPr/>
+          <p:nvPr/>
+        </p:nvPicPr>
+        <p:blipFill>
+          <a:blip r:embed="rId1"/>
+          <a:stretch/>
+        </p:blipFill>
+        <p:spPr>
+          <a:xfrm>
+            <a:off x="5257800" y="685800"/>
+            <a:ext cx="3294360" cy="4457880"/>
+          </a:xfrm>
+          <a:prstGeom prst="rect">
+            <a:avLst/>
+          </a:prstGeom>
+          <a:noFill/>
+          <a:ln w="0">
+            <a:noFill/>
+          </a:ln>
+        </p:spPr>
+      </p:pic>
+      <p:pic>
+        <p:nvPicPr>
+          <p:cNvPr id="243" name="" descr=""/>
+          <p:cNvPicPr/>
+          <p:nvPr/>
+        </p:nvPicPr>
+        <p:blipFill>
+          <a:blip r:embed="rId2"/>
+          <a:stretch/>
+        </p:blipFill>
+        <p:spPr>
+          <a:xfrm>
+            <a:off x="3657600" y="3429000"/>
+            <a:ext cx="1560960" cy="1492560"/>
+          </a:xfrm>
+          <a:prstGeom prst="rect">
+            <a:avLst/>
+          </a:prstGeom>
+          <a:noFill/>
+          <a:ln w="0">
+            <a:noFill/>
+          </a:ln>
+        </p:spPr>
+      </p:pic>
     </p:spTree>
   </p:cSld>
   <mc:AlternateContent>
@@ -11990,7 +12154,7 @@
       </p:grpSpPr>
       <p:sp>
         <p:nvSpPr>
-          <p:cNvPr id="240" name="PlaceHolder 1"/>
+          <p:cNvPr id="244" name="PlaceHolder 1"/>
           <p:cNvSpPr>
             <a:spLocks noGrp="1"/>
           </p:cNvSpPr>
@@ -12048,51 +12212,9 @@
           </a:p>
         </p:txBody>
       </p:sp>
-      <p:sp>
-        <p:nvSpPr>
-          <p:cNvPr id="241" name="PlaceHolder 2"/>
-          <p:cNvSpPr>
-            <a:spLocks noGrp="1"/>
-          </p:cNvSpPr>
-          <p:nvPr>
-            <p:ph type="subTitle"/>
-          </p:nvPr>
-        </p:nvSpPr>
-        <p:spPr>
-          <a:xfrm>
-            <a:off x="2133720" y="3152880"/>
-            <a:ext cx="5571000" cy="1323000"/>
-          </a:xfrm>
-          <a:prstGeom prst="rect">
-            <a:avLst/>
-          </a:prstGeom>
-          <a:noFill/>
-          <a:ln w="0">
-            <a:noFill/>
-          </a:ln>
-        </p:spPr>
-        <p:txBody>
-          <a:bodyPr lIns="91440" rIns="91440" tIns="91440" bIns="91440" anchor="t">
-            <a:normAutofit/>
-          </a:bodyPr>
-          <a:p>
-            <a:pPr indent="0" algn="ctr">
-              <a:buNone/>
-            </a:pPr>
-            <a:endParaRPr b="0" lang="en-US" sz="1800" strike="noStrike" u="none">
-              <a:solidFill>
-                <a:srgbClr val="ffffff"/>
-              </a:solidFill>
-              <a:effectLst/>
-              <a:uFillTx/>
-              <a:latin typeface="Arial"/>
-            </a:endParaRPr>
-          </a:p>
-        </p:txBody>
-      </p:sp>
       <p:cxnSp>
         <p:nvCxnSpPr>
-          <p:cNvPr id="242" name="Google Shape;369;p40"/>
+          <p:cNvPr id="245" name="Google Shape;369;p40"/>
           <p:cNvCxnSpPr/>
           <p:nvPr/>
         </p:nvCxnSpPr>
@@ -12114,7 +12236,7 @@
       </p:cxnSp>
       <p:cxnSp>
         <p:nvCxnSpPr>
-          <p:cNvPr id="243" name="Google Shape;370;p40"/>
+          <p:cNvPr id="246" name="Google Shape;370;p40"/>
           <p:cNvCxnSpPr/>
           <p:nvPr/>
         </p:nvCxnSpPr>
@@ -12136,7 +12258,7 @@
       </p:cxnSp>
       <p:cxnSp>
         <p:nvCxnSpPr>
-          <p:cNvPr id="244" name="Google Shape;371;p40"/>
+          <p:cNvPr id="247" name="Google Shape;371;p40"/>
           <p:cNvCxnSpPr/>
           <p:nvPr/>
         </p:nvCxnSpPr>
@@ -12158,7 +12280,7 @@
       </p:cxnSp>
       <p:grpSp>
         <p:nvGrpSpPr>
-          <p:cNvPr id="245" name="Google Shape;372;p40"/>
+          <p:cNvPr id="248" name="Google Shape;372;p40"/>
           <p:cNvGrpSpPr/>
           <p:nvPr/>
         </p:nvGrpSpPr>
@@ -12172,7 +12294,7 @@
         </p:grpSpPr>
         <p:cxnSp>
           <p:nvCxnSpPr>
-            <p:cNvPr id="246" name="Google Shape;373;p40"/>
+            <p:cNvPr id="249" name="Google Shape;373;p40"/>
             <p:cNvCxnSpPr/>
             <p:nvPr/>
           </p:nvCxnSpPr>
@@ -12194,7 +12316,7 @@
         </p:cxnSp>
         <p:cxnSp>
           <p:nvCxnSpPr>
-            <p:cNvPr id="247" name="Google Shape;374;p40"/>
+            <p:cNvPr id="250" name="Google Shape;374;p40"/>
             <p:cNvCxnSpPr/>
             <p:nvPr/>
           </p:nvCxnSpPr>
@@ -12216,7 +12338,7 @@
         </p:cxnSp>
         <p:cxnSp>
           <p:nvCxnSpPr>
-            <p:cNvPr id="248" name="Google Shape;375;p40"/>
+            <p:cNvPr id="251" name="Google Shape;375;p40"/>
             <p:cNvCxnSpPr/>
             <p:nvPr/>
           </p:nvCxnSpPr>
@@ -12238,7 +12360,7 @@
         </p:cxnSp>
         <p:cxnSp>
           <p:nvCxnSpPr>
-            <p:cNvPr id="249" name="Google Shape;376;p40"/>
+            <p:cNvPr id="252" name="Google Shape;376;p40"/>
             <p:cNvCxnSpPr/>
             <p:nvPr/>
           </p:nvCxnSpPr>
@@ -12291,7 +12413,7 @@
       </p:grpSpPr>
       <p:sp>
         <p:nvSpPr>
-          <p:cNvPr id="250" name="PlaceHolder 1"/>
+          <p:cNvPr id="253" name="PlaceHolder 1"/>
           <p:cNvSpPr>
             <a:spLocks noGrp="1"/>
           </p:cNvSpPr>
@@ -12349,51 +12471,9 @@
           </a:p>
         </p:txBody>
       </p:sp>
-      <p:sp>
-        <p:nvSpPr>
-          <p:cNvPr id="251" name="PlaceHolder 2"/>
-          <p:cNvSpPr>
-            <a:spLocks noGrp="1"/>
-          </p:cNvSpPr>
-          <p:nvPr>
-            <p:ph type="subTitle"/>
-          </p:nvPr>
-        </p:nvSpPr>
-        <p:spPr>
-          <a:xfrm>
-            <a:off x="2133720" y="3152880"/>
-            <a:ext cx="5571000" cy="1323000"/>
-          </a:xfrm>
-          <a:prstGeom prst="rect">
-            <a:avLst/>
-          </a:prstGeom>
-          <a:noFill/>
-          <a:ln w="0">
-            <a:noFill/>
-          </a:ln>
-        </p:spPr>
-        <p:txBody>
-          <a:bodyPr lIns="91440" rIns="91440" tIns="91440" bIns="91440" anchor="t">
-            <a:normAutofit/>
-          </a:bodyPr>
-          <a:p>
-            <a:pPr indent="0" algn="ctr">
-              <a:buNone/>
-            </a:pPr>
-            <a:endParaRPr b="0" lang="en-US" sz="1800" strike="noStrike" u="none">
-              <a:solidFill>
-                <a:srgbClr val="ffffff"/>
-              </a:solidFill>
-              <a:effectLst/>
-              <a:uFillTx/>
-              <a:latin typeface="Arial"/>
-            </a:endParaRPr>
-          </a:p>
-        </p:txBody>
-      </p:sp>
       <p:cxnSp>
         <p:nvCxnSpPr>
-          <p:cNvPr id="252" name="Google Shape;369;p40"/>
+          <p:cNvPr id="254" name="Google Shape;369;p40"/>
           <p:cNvCxnSpPr/>
           <p:nvPr/>
         </p:nvCxnSpPr>
@@ -12415,7 +12495,7 @@
       </p:cxnSp>
       <p:cxnSp>
         <p:nvCxnSpPr>
-          <p:cNvPr id="253" name="Google Shape;370;p40"/>
+          <p:cNvPr id="255" name="Google Shape;370;p40"/>
           <p:cNvCxnSpPr/>
           <p:nvPr/>
         </p:nvCxnSpPr>
@@ -12437,7 +12517,7 @@
       </p:cxnSp>
       <p:cxnSp>
         <p:nvCxnSpPr>
-          <p:cNvPr id="254" name="Google Shape;371;p40"/>
+          <p:cNvPr id="256" name="Google Shape;371;p40"/>
           <p:cNvCxnSpPr/>
           <p:nvPr/>
         </p:nvCxnSpPr>
@@ -12459,7 +12539,7 @@
       </p:cxnSp>
       <p:grpSp>
         <p:nvGrpSpPr>
-          <p:cNvPr id="255" name="Google Shape;372;p40"/>
+          <p:cNvPr id="257" name="Google Shape;372;p40"/>
           <p:cNvGrpSpPr/>
           <p:nvPr/>
         </p:nvGrpSpPr>
@@ -12473,7 +12553,7 @@
         </p:grpSpPr>
         <p:cxnSp>
           <p:nvCxnSpPr>
-            <p:cNvPr id="256" name="Google Shape;373;p40"/>
+            <p:cNvPr id="258" name="Google Shape;373;p40"/>
             <p:cNvCxnSpPr/>
             <p:nvPr/>
           </p:nvCxnSpPr>
@@ -12495,7 +12575,7 @@
         </p:cxnSp>
         <p:cxnSp>
           <p:nvCxnSpPr>
-            <p:cNvPr id="257" name="Google Shape;374;p40"/>
+            <p:cNvPr id="259" name="Google Shape;374;p40"/>
             <p:cNvCxnSpPr/>
             <p:nvPr/>
           </p:nvCxnSpPr>
@@ -12517,7 +12597,7 @@
         </p:cxnSp>
         <p:cxnSp>
           <p:nvCxnSpPr>
-            <p:cNvPr id="258" name="Google Shape;375;p40"/>
+            <p:cNvPr id="260" name="Google Shape;375;p40"/>
             <p:cNvCxnSpPr/>
             <p:nvPr/>
           </p:nvCxnSpPr>
@@ -12539,7 +12619,7 @@
         </p:cxnSp>
         <p:cxnSp>
           <p:nvCxnSpPr>
-            <p:cNvPr id="259" name="Google Shape;376;p40"/>
+            <p:cNvPr id="261" name="Google Shape;376;p40"/>
             <p:cNvCxnSpPr/>
             <p:nvPr/>
           </p:nvCxnSpPr>
@@ -12560,6 +12640,34 @@
           </p:spPr>
         </p:cxnSp>
       </p:grpSp>
+      <p:pic>
+        <p:nvPicPr>
+          <p:cNvPr id="262" name="Google Shape;524;p 1" descr=""/>
+          <p:cNvPicPr/>
+          <p:nvPr/>
+        </p:nvPicPr>
+        <p:blipFill>
+          <a:blip r:embed="rId1"/>
+          <a:srcRect l="18588" t="0" r="18588" b="0"/>
+          <a:stretch/>
+        </p:blipFill>
+        <p:spPr>
+          <a:xfrm>
+            <a:off x="5486400" y="1038600"/>
+            <a:ext cx="3815640" cy="4105080"/>
+          </a:xfrm>
+          <a:prstGeom prst="rect">
+            <a:avLst/>
+          </a:prstGeom>
+          <a:noFill/>
+          <a:ln w="9525">
+            <a:solidFill>
+              <a:srgbClr val="ffffff"/>
+            </a:solidFill>
+            <a:round/>
+          </a:ln>
+        </p:spPr>
+      </p:pic>
     </p:spTree>
   </p:cSld>
   <mc:AlternateContent>

</xml_diff>